<commit_message>
Small Updates - Burt & Chris, 4/25
</commit_message>
<xml_diff>
--- a/Tesla_Expo_Poster.pptx
+++ b/Tesla_Expo_Poster.pptx
@@ -1,19 +1,19 @@
 
 <file path=ppt/presentation.xml><?xml version="1.0" encoding="utf-8"?>
-<p:presentation xmlns:a="http://schemas.openxmlformats.org/drawingml/2006/main" xmlns:r="http://schemas.openxmlformats.org/officeDocument/2006/relationships" xmlns:mc="http://schemas.openxmlformats.org/markup-compatibility/2006" xmlns:mv="urn:schemas-microsoft-com:mac:vml" xmlns:p="http://schemas.openxmlformats.org/presentationml/2006/main" xmlns:c="http://schemas.openxmlformats.org/drawingml/2006/chart" xmlns:dgm="http://schemas.openxmlformats.org/drawingml/2006/diagram" xmlns:o="urn:schemas-microsoft-com:office:office" xmlns:v="urn:schemas-microsoft-com:vml" xmlns:pvml="urn:schemas-microsoft-com:office:powerpoint" xmlns:com="http://schemas.openxmlformats.org/drawingml/2006/compatibility" xmlns:p14="http://schemas.microsoft.com/office/powerpoint/2010/main" xmlns:p15="http://schemas.microsoft.com/office/powerpoint/2012/main" autoCompressPictures="0" strictFirstAndLastChars="0" saveSubsetFonts="1">
+<p:presentation xmlns:a="http://schemas.openxmlformats.org/drawingml/2006/main" xmlns:r="http://schemas.openxmlformats.org/officeDocument/2006/relationships" xmlns:p="http://schemas.openxmlformats.org/presentationml/2006/main" strictFirstAndLastChars="0" saveSubsetFonts="1" autoCompressPictures="0">
   <p:sldMasterIdLst>
-    <p:sldMasterId id="2147483649" r:id="rId4"/>
+    <p:sldMasterId id="2147483649" r:id="rId1"/>
   </p:sldMasterIdLst>
   <p:notesMasterIdLst>
-    <p:notesMasterId r:id="rId5"/>
+    <p:notesMasterId r:id="rId3"/>
   </p:notesMasterIdLst>
   <p:sldIdLst>
-    <p:sldId id="256" r:id="rId6"/>
+    <p:sldId id="256" r:id="rId2"/>
   </p:sldIdLst>
-  <p:sldSz cy="32918400" cx="43891200"/>
+  <p:sldSz cx="43891200" cy="32918400"/>
   <p:notesSz cx="6858000" cy="9144000"/>
   <p:defaultTextStyle>
-    <a:defPPr lvl="0" marR="0" rtl="0" algn="l">
+    <a:defPPr marR="0" lvl="0" algn="l" rtl="0">
       <a:lnSpc>
         <a:spcPct val="100000"/>
       </a:lnSpc>
@@ -24,7 +24,7 @@
         <a:spcPts val="0"/>
       </a:spcAft>
     </a:defPPr>
-    <a:lvl1pPr lvl="0" marR="0" rtl="0" algn="l">
+    <a:lvl1pPr marR="0" lvl="0" algn="l" rtl="0">
       <a:lnSpc>
         <a:spcPct val="100000"/>
       </a:lnSpc>
@@ -38,7 +38,7 @@
         <a:srgbClr val="000000"/>
       </a:buClr>
       <a:buFont typeface="Arial"/>
-      <a:defRPr b="0" i="0" sz="1400" u="none" cap="none" strike="noStrike">
+      <a:defRPr sz="1400" b="0" i="0" u="none" strike="noStrike" cap="none">
         <a:solidFill>
           <a:srgbClr val="000000"/>
         </a:solidFill>
@@ -48,7 +48,7 @@
         <a:sym typeface="Arial"/>
       </a:defRPr>
     </a:lvl1pPr>
-    <a:lvl2pPr lvl="1" marR="0" rtl="0" algn="l">
+    <a:lvl2pPr marR="0" lvl="1" algn="l" rtl="0">
       <a:lnSpc>
         <a:spcPct val="100000"/>
       </a:lnSpc>
@@ -62,7 +62,7 @@
         <a:srgbClr val="000000"/>
       </a:buClr>
       <a:buFont typeface="Arial"/>
-      <a:defRPr b="0" i="0" sz="1400" u="none" cap="none" strike="noStrike">
+      <a:defRPr sz="1400" b="0" i="0" u="none" strike="noStrike" cap="none">
         <a:solidFill>
           <a:srgbClr val="000000"/>
         </a:solidFill>
@@ -72,7 +72,7 @@
         <a:sym typeface="Arial"/>
       </a:defRPr>
     </a:lvl2pPr>
-    <a:lvl3pPr lvl="2" marR="0" rtl="0" algn="l">
+    <a:lvl3pPr marR="0" lvl="2" algn="l" rtl="0">
       <a:lnSpc>
         <a:spcPct val="100000"/>
       </a:lnSpc>
@@ -86,7 +86,7 @@
         <a:srgbClr val="000000"/>
       </a:buClr>
       <a:buFont typeface="Arial"/>
-      <a:defRPr b="0" i="0" sz="1400" u="none" cap="none" strike="noStrike">
+      <a:defRPr sz="1400" b="0" i="0" u="none" strike="noStrike" cap="none">
         <a:solidFill>
           <a:srgbClr val="000000"/>
         </a:solidFill>
@@ -96,7 +96,7 @@
         <a:sym typeface="Arial"/>
       </a:defRPr>
     </a:lvl3pPr>
-    <a:lvl4pPr lvl="3" marR="0" rtl="0" algn="l">
+    <a:lvl4pPr marR="0" lvl="3" algn="l" rtl="0">
       <a:lnSpc>
         <a:spcPct val="100000"/>
       </a:lnSpc>
@@ -110,7 +110,7 @@
         <a:srgbClr val="000000"/>
       </a:buClr>
       <a:buFont typeface="Arial"/>
-      <a:defRPr b="0" i="0" sz="1400" u="none" cap="none" strike="noStrike">
+      <a:defRPr sz="1400" b="0" i="0" u="none" strike="noStrike" cap="none">
         <a:solidFill>
           <a:srgbClr val="000000"/>
         </a:solidFill>
@@ -120,7 +120,7 @@
         <a:sym typeface="Arial"/>
       </a:defRPr>
     </a:lvl4pPr>
-    <a:lvl5pPr lvl="4" marR="0" rtl="0" algn="l">
+    <a:lvl5pPr marR="0" lvl="4" algn="l" rtl="0">
       <a:lnSpc>
         <a:spcPct val="100000"/>
       </a:lnSpc>
@@ -134,7 +134,7 @@
         <a:srgbClr val="000000"/>
       </a:buClr>
       <a:buFont typeface="Arial"/>
-      <a:defRPr b="0" i="0" sz="1400" u="none" cap="none" strike="noStrike">
+      <a:defRPr sz="1400" b="0" i="0" u="none" strike="noStrike" cap="none">
         <a:solidFill>
           <a:srgbClr val="000000"/>
         </a:solidFill>
@@ -144,7 +144,7 @@
         <a:sym typeface="Arial"/>
       </a:defRPr>
     </a:lvl5pPr>
-    <a:lvl6pPr lvl="5" marR="0" rtl="0" algn="l">
+    <a:lvl6pPr marR="0" lvl="5" algn="l" rtl="0">
       <a:lnSpc>
         <a:spcPct val="100000"/>
       </a:lnSpc>
@@ -158,7 +158,7 @@
         <a:srgbClr val="000000"/>
       </a:buClr>
       <a:buFont typeface="Arial"/>
-      <a:defRPr b="0" i="0" sz="1400" u="none" cap="none" strike="noStrike">
+      <a:defRPr sz="1400" b="0" i="0" u="none" strike="noStrike" cap="none">
         <a:solidFill>
           <a:srgbClr val="000000"/>
         </a:solidFill>
@@ -168,7 +168,7 @@
         <a:sym typeface="Arial"/>
       </a:defRPr>
     </a:lvl6pPr>
-    <a:lvl7pPr lvl="6" marR="0" rtl="0" algn="l">
+    <a:lvl7pPr marR="0" lvl="6" algn="l" rtl="0">
       <a:lnSpc>
         <a:spcPct val="100000"/>
       </a:lnSpc>
@@ -182,7 +182,7 @@
         <a:srgbClr val="000000"/>
       </a:buClr>
       <a:buFont typeface="Arial"/>
-      <a:defRPr b="0" i="0" sz="1400" u="none" cap="none" strike="noStrike">
+      <a:defRPr sz="1400" b="0" i="0" u="none" strike="noStrike" cap="none">
         <a:solidFill>
           <a:srgbClr val="000000"/>
         </a:solidFill>
@@ -192,7 +192,7 @@
         <a:sym typeface="Arial"/>
       </a:defRPr>
     </a:lvl7pPr>
-    <a:lvl8pPr lvl="7" marR="0" rtl="0" algn="l">
+    <a:lvl8pPr marR="0" lvl="7" algn="l" rtl="0">
       <a:lnSpc>
         <a:spcPct val="100000"/>
       </a:lnSpc>
@@ -206,7 +206,7 @@
         <a:srgbClr val="000000"/>
       </a:buClr>
       <a:buFont typeface="Arial"/>
-      <a:defRPr b="0" i="0" sz="1400" u="none" cap="none" strike="noStrike">
+      <a:defRPr sz="1400" b="0" i="0" u="none" strike="noStrike" cap="none">
         <a:solidFill>
           <a:srgbClr val="000000"/>
         </a:solidFill>
@@ -216,7 +216,7 @@
         <a:sym typeface="Arial"/>
       </a:defRPr>
     </a:lvl8pPr>
-    <a:lvl9pPr lvl="8" marR="0" rtl="0" algn="l">
+    <a:lvl9pPr marR="0" lvl="8" algn="l" rtl="0">
       <a:lnSpc>
         <a:spcPct val="100000"/>
       </a:lnSpc>
@@ -230,7 +230,7 @@
         <a:srgbClr val="000000"/>
       </a:buClr>
       <a:buFont typeface="Arial"/>
-      <a:defRPr b="0" i="0" sz="1400" u="none" cap="none" strike="noStrike">
+      <a:defRPr sz="1400" b="0" i="0" u="none" strike="noStrike" cap="none">
         <a:solidFill>
           <a:srgbClr val="000000"/>
         </a:solidFill>
@@ -243,7 +243,7 @@
   </p:defaultTextStyle>
   <p:extLst>
     <p:ext uri="{EFAFB233-063F-42B5-8137-9DF3F51BA10A}">
-      <p15:sldGuideLst>
+      <p15:sldGuideLst xmlns:p15="http://schemas.microsoft.com/office/powerpoint/2012/main">
         <p15:guide id="1" orient="horz" pos="19551">
           <p15:clr>
             <a:srgbClr val="A4A3A4"/>
@@ -291,18 +291,19 @@
 </file>
 
 <file path=ppt/notesMasters/notesMaster1.xml><?xml version="1.0" encoding="utf-8"?>
-<p:notesMaster xmlns:a="http://schemas.openxmlformats.org/drawingml/2006/main" xmlns:r="http://schemas.openxmlformats.org/officeDocument/2006/relationships" xmlns:mc="http://schemas.openxmlformats.org/markup-compatibility/2006" xmlns:mv="urn:schemas-microsoft-com:mac:vml" xmlns:p="http://schemas.openxmlformats.org/presentationml/2006/main" xmlns:c="http://schemas.openxmlformats.org/drawingml/2006/chart" xmlns:dgm="http://schemas.openxmlformats.org/drawingml/2006/diagram" xmlns:o="urn:schemas-microsoft-com:office:office" xmlns:v="urn:schemas-microsoft-com:vml" xmlns:pvml="urn:schemas-microsoft-com:office:powerpoint" xmlns:com="http://schemas.openxmlformats.org/drawingml/2006/compatibility" xmlns:p14="http://schemas.microsoft.com/office/powerpoint/2010/main" xmlns:p15="http://schemas.microsoft.com/office/powerpoint/2012/main">
+<p:notesMaster xmlns:a="http://schemas.openxmlformats.org/drawingml/2006/main" xmlns:r="http://schemas.openxmlformats.org/officeDocument/2006/relationships" xmlns:p="http://schemas.openxmlformats.org/presentationml/2006/main">
   <p:cSld>
     <p:bg>
       <p:bgPr>
         <a:solidFill>
           <a:schemeClr val="lt1"/>
         </a:solidFill>
+        <a:effectLst/>
       </p:bgPr>
     </p:bg>
     <p:spTree>
       <p:nvGrpSpPr>
-        <p:cNvPr id="2" name="Shape 2"/>
+        <p:cNvPr id="1" name="Shape 2"/>
         <p:cNvGrpSpPr/>
         <p:nvPr/>
       </p:nvGrpSpPr>
@@ -317,9 +318,11 @@
       <p:sp>
         <p:nvSpPr>
           <p:cNvPr id="3" name="Google Shape;3;n"/>
-          <p:cNvSpPr txBox="1"/>
+          <p:cNvSpPr txBox="1">
+            <a:spLocks noGrp="1"/>
+          </p:cNvSpPr>
           <p:nvPr>
-            <p:ph idx="2" type="hdr"/>
+            <p:ph type="hdr" idx="2"/>
           </p:nvPr>
         </p:nvSpPr>
         <p:spPr>
@@ -336,9 +339,9 @@
           </a:ln>
         </p:spPr>
         <p:txBody>
-          <a:bodyPr anchorCtr="0" anchor="t" bIns="45700" lIns="91425" spcFirstLastPara="1" rIns="91425" wrap="square" tIns="45700"/>
+          <a:bodyPr spcFirstLastPara="1" wrap="square" lIns="91425" tIns="45700" rIns="91425" bIns="45700" anchor="t" anchorCtr="0"/>
           <a:lstStyle>
-            <a:lvl1pPr lvl="0" marR="0" rtl="0" algn="l">
+            <a:lvl1pPr marR="0" lvl="0" algn="l" rtl="0">
               <a:spcBef>
                 <a:spcPts val="0"/>
               </a:spcBef>
@@ -347,7 +350,7 @@
               </a:spcAft>
               <a:buSzPts val="1400"/>
               <a:buNone/>
-              <a:defRPr b="0" i="0" sz="1200" u="none" cap="none" strike="noStrike">
+              <a:defRPr sz="1200" b="0" i="0" u="none" strike="noStrike" cap="none">
                 <a:solidFill>
                   <a:schemeClr val="dk1"/>
                 </a:solidFill>
@@ -357,7 +360,7 @@
                 <a:sym typeface="Arial"/>
               </a:defRPr>
             </a:lvl1pPr>
-            <a:lvl2pPr lvl="1" marR="0" rtl="0" algn="l">
+            <a:lvl2pPr marR="0" lvl="1" algn="l" rtl="0">
               <a:spcBef>
                 <a:spcPts val="0"/>
               </a:spcBef>
@@ -366,7 +369,7 @@
               </a:spcAft>
               <a:buSzPts val="1400"/>
               <a:buNone/>
-              <a:defRPr b="0" i="0" sz="7000" u="none" cap="none" strike="noStrike">
+              <a:defRPr sz="7000" b="0" i="0" u="none" strike="noStrike" cap="none">
                 <a:solidFill>
                   <a:schemeClr val="dk1"/>
                 </a:solidFill>
@@ -376,7 +379,7 @@
                 <a:sym typeface="Calibri"/>
               </a:defRPr>
             </a:lvl2pPr>
-            <a:lvl3pPr lvl="2" marR="0" rtl="0" algn="l">
+            <a:lvl3pPr marR="0" lvl="2" algn="l" rtl="0">
               <a:spcBef>
                 <a:spcPts val="0"/>
               </a:spcBef>
@@ -385,7 +388,7 @@
               </a:spcAft>
               <a:buSzPts val="1400"/>
               <a:buNone/>
-              <a:defRPr b="0" i="0" sz="7000" u="none" cap="none" strike="noStrike">
+              <a:defRPr sz="7000" b="0" i="0" u="none" strike="noStrike" cap="none">
                 <a:solidFill>
                   <a:schemeClr val="dk1"/>
                 </a:solidFill>
@@ -395,7 +398,7 @@
                 <a:sym typeface="Calibri"/>
               </a:defRPr>
             </a:lvl3pPr>
-            <a:lvl4pPr lvl="3" marR="0" rtl="0" algn="l">
+            <a:lvl4pPr marR="0" lvl="3" algn="l" rtl="0">
               <a:spcBef>
                 <a:spcPts val="0"/>
               </a:spcBef>
@@ -404,7 +407,7 @@
               </a:spcAft>
               <a:buSzPts val="1400"/>
               <a:buNone/>
-              <a:defRPr b="0" i="0" sz="7000" u="none" cap="none" strike="noStrike">
+              <a:defRPr sz="7000" b="0" i="0" u="none" strike="noStrike" cap="none">
                 <a:solidFill>
                   <a:schemeClr val="dk1"/>
                 </a:solidFill>
@@ -414,7 +417,7 @@
                 <a:sym typeface="Calibri"/>
               </a:defRPr>
             </a:lvl4pPr>
-            <a:lvl5pPr lvl="4" marR="0" rtl="0" algn="l">
+            <a:lvl5pPr marR="0" lvl="4" algn="l" rtl="0">
               <a:spcBef>
                 <a:spcPts val="0"/>
               </a:spcBef>
@@ -423,7 +426,7 @@
               </a:spcAft>
               <a:buSzPts val="1400"/>
               <a:buNone/>
-              <a:defRPr b="0" i="0" sz="7000" u="none" cap="none" strike="noStrike">
+              <a:defRPr sz="7000" b="0" i="0" u="none" strike="noStrike" cap="none">
                 <a:solidFill>
                   <a:schemeClr val="dk1"/>
                 </a:solidFill>
@@ -433,7 +436,7 @@
                 <a:sym typeface="Calibri"/>
               </a:defRPr>
             </a:lvl5pPr>
-            <a:lvl6pPr lvl="5" marR="0" rtl="0" algn="l">
+            <a:lvl6pPr marR="0" lvl="5" algn="l" rtl="0">
               <a:spcBef>
                 <a:spcPts val="0"/>
               </a:spcBef>
@@ -442,7 +445,7 @@
               </a:spcAft>
               <a:buSzPts val="1400"/>
               <a:buNone/>
-              <a:defRPr b="0" i="0" sz="7000" u="none" cap="none" strike="noStrike">
+              <a:defRPr sz="7000" b="0" i="0" u="none" strike="noStrike" cap="none">
                 <a:solidFill>
                   <a:schemeClr val="dk1"/>
                 </a:solidFill>
@@ -452,7 +455,7 @@
                 <a:sym typeface="Calibri"/>
               </a:defRPr>
             </a:lvl6pPr>
-            <a:lvl7pPr lvl="6" marR="0" rtl="0" algn="l">
+            <a:lvl7pPr marR="0" lvl="6" algn="l" rtl="0">
               <a:spcBef>
                 <a:spcPts val="0"/>
               </a:spcBef>
@@ -461,7 +464,7 @@
               </a:spcAft>
               <a:buSzPts val="1400"/>
               <a:buNone/>
-              <a:defRPr b="0" i="0" sz="7000" u="none" cap="none" strike="noStrike">
+              <a:defRPr sz="7000" b="0" i="0" u="none" strike="noStrike" cap="none">
                 <a:solidFill>
                   <a:schemeClr val="dk1"/>
                 </a:solidFill>
@@ -471,7 +474,7 @@
                 <a:sym typeface="Calibri"/>
               </a:defRPr>
             </a:lvl7pPr>
-            <a:lvl8pPr lvl="7" marR="0" rtl="0" algn="l">
+            <a:lvl8pPr marR="0" lvl="7" algn="l" rtl="0">
               <a:spcBef>
                 <a:spcPts val="0"/>
               </a:spcBef>
@@ -480,7 +483,7 @@
               </a:spcAft>
               <a:buSzPts val="1400"/>
               <a:buNone/>
-              <a:defRPr b="0" i="0" sz="7000" u="none" cap="none" strike="noStrike">
+              <a:defRPr sz="7000" b="0" i="0" u="none" strike="noStrike" cap="none">
                 <a:solidFill>
                   <a:schemeClr val="dk1"/>
                 </a:solidFill>
@@ -490,7 +493,7 @@
                 <a:sym typeface="Calibri"/>
               </a:defRPr>
             </a:lvl8pPr>
-            <a:lvl9pPr lvl="8" marR="0" rtl="0" algn="l">
+            <a:lvl9pPr marR="0" lvl="8" algn="l" rtl="0">
               <a:spcBef>
                 <a:spcPts val="0"/>
               </a:spcBef>
@@ -499,7 +502,7 @@
               </a:spcAft>
               <a:buSzPts val="1400"/>
               <a:buNone/>
-              <a:defRPr b="0" i="0" sz="7000" u="none" cap="none" strike="noStrike">
+              <a:defRPr sz="7000" b="0" i="0" u="none" strike="noStrike" cap="none">
                 <a:solidFill>
                   <a:schemeClr val="dk1"/>
                 </a:solidFill>
@@ -510,15 +513,19 @@
               </a:defRPr>
             </a:lvl9pPr>
           </a:lstStyle>
-          <a:p/>
+          <a:p>
+            <a:endParaRPr/>
+          </a:p>
         </p:txBody>
       </p:sp>
       <p:sp>
         <p:nvSpPr>
           <p:cNvPr id="4" name="Google Shape;4;n"/>
-          <p:cNvSpPr txBox="1"/>
+          <p:cNvSpPr txBox="1">
+            <a:spLocks noGrp="1"/>
+          </p:cNvSpPr>
           <p:nvPr>
-            <p:ph idx="10" type="dt"/>
+            <p:ph type="dt" idx="10"/>
           </p:nvPr>
         </p:nvSpPr>
         <p:spPr>
@@ -535,9 +542,9 @@
           </a:ln>
         </p:spPr>
         <p:txBody>
-          <a:bodyPr anchorCtr="0" anchor="t" bIns="45700" lIns="91425" spcFirstLastPara="1" rIns="91425" wrap="square" tIns="45700"/>
+          <a:bodyPr spcFirstLastPara="1" wrap="square" lIns="91425" tIns="45700" rIns="91425" bIns="45700" anchor="t" anchorCtr="0"/>
           <a:lstStyle>
-            <a:lvl1pPr lvl="0" marR="0" rtl="0" algn="r">
+            <a:lvl1pPr marR="0" lvl="0" algn="r" rtl="0">
               <a:spcBef>
                 <a:spcPts val="0"/>
               </a:spcBef>
@@ -546,7 +553,7 @@
               </a:spcAft>
               <a:buSzPts val="1400"/>
               <a:buNone/>
-              <a:defRPr b="0" i="0" sz="1200" u="none" cap="none" strike="noStrike">
+              <a:defRPr sz="1200" b="0" i="0" u="none" strike="noStrike" cap="none">
                 <a:solidFill>
                   <a:schemeClr val="dk1"/>
                 </a:solidFill>
@@ -556,7 +563,7 @@
                 <a:sym typeface="Arial"/>
               </a:defRPr>
             </a:lvl1pPr>
-            <a:lvl2pPr lvl="1" marR="0" rtl="0" algn="l">
+            <a:lvl2pPr marR="0" lvl="1" algn="l" rtl="0">
               <a:spcBef>
                 <a:spcPts val="0"/>
               </a:spcBef>
@@ -565,7 +572,7 @@
               </a:spcAft>
               <a:buSzPts val="1400"/>
               <a:buNone/>
-              <a:defRPr b="0" i="0" sz="7000" u="none" cap="none" strike="noStrike">
+              <a:defRPr sz="7000" b="0" i="0" u="none" strike="noStrike" cap="none">
                 <a:solidFill>
                   <a:schemeClr val="dk1"/>
                 </a:solidFill>
@@ -575,7 +582,7 @@
                 <a:sym typeface="Calibri"/>
               </a:defRPr>
             </a:lvl2pPr>
-            <a:lvl3pPr lvl="2" marR="0" rtl="0" algn="l">
+            <a:lvl3pPr marR="0" lvl="2" algn="l" rtl="0">
               <a:spcBef>
                 <a:spcPts val="0"/>
               </a:spcBef>
@@ -584,7 +591,7 @@
               </a:spcAft>
               <a:buSzPts val="1400"/>
               <a:buNone/>
-              <a:defRPr b="0" i="0" sz="7000" u="none" cap="none" strike="noStrike">
+              <a:defRPr sz="7000" b="0" i="0" u="none" strike="noStrike" cap="none">
                 <a:solidFill>
                   <a:schemeClr val="dk1"/>
                 </a:solidFill>
@@ -594,7 +601,7 @@
                 <a:sym typeface="Calibri"/>
               </a:defRPr>
             </a:lvl3pPr>
-            <a:lvl4pPr lvl="3" marR="0" rtl="0" algn="l">
+            <a:lvl4pPr marR="0" lvl="3" algn="l" rtl="0">
               <a:spcBef>
                 <a:spcPts val="0"/>
               </a:spcBef>
@@ -603,7 +610,7 @@
               </a:spcAft>
               <a:buSzPts val="1400"/>
               <a:buNone/>
-              <a:defRPr b="0" i="0" sz="7000" u="none" cap="none" strike="noStrike">
+              <a:defRPr sz="7000" b="0" i="0" u="none" strike="noStrike" cap="none">
                 <a:solidFill>
                   <a:schemeClr val="dk1"/>
                 </a:solidFill>
@@ -613,7 +620,7 @@
                 <a:sym typeface="Calibri"/>
               </a:defRPr>
             </a:lvl4pPr>
-            <a:lvl5pPr lvl="4" marR="0" rtl="0" algn="l">
+            <a:lvl5pPr marR="0" lvl="4" algn="l" rtl="0">
               <a:spcBef>
                 <a:spcPts val="0"/>
               </a:spcBef>
@@ -622,7 +629,7 @@
               </a:spcAft>
               <a:buSzPts val="1400"/>
               <a:buNone/>
-              <a:defRPr b="0" i="0" sz="7000" u="none" cap="none" strike="noStrike">
+              <a:defRPr sz="7000" b="0" i="0" u="none" strike="noStrike" cap="none">
                 <a:solidFill>
                   <a:schemeClr val="dk1"/>
                 </a:solidFill>
@@ -632,7 +639,7 @@
                 <a:sym typeface="Calibri"/>
               </a:defRPr>
             </a:lvl5pPr>
-            <a:lvl6pPr lvl="5" marR="0" rtl="0" algn="l">
+            <a:lvl6pPr marR="0" lvl="5" algn="l" rtl="0">
               <a:spcBef>
                 <a:spcPts val="0"/>
               </a:spcBef>
@@ -641,7 +648,7 @@
               </a:spcAft>
               <a:buSzPts val="1400"/>
               <a:buNone/>
-              <a:defRPr b="0" i="0" sz="7000" u="none" cap="none" strike="noStrike">
+              <a:defRPr sz="7000" b="0" i="0" u="none" strike="noStrike" cap="none">
                 <a:solidFill>
                   <a:schemeClr val="dk1"/>
                 </a:solidFill>
@@ -651,7 +658,7 @@
                 <a:sym typeface="Calibri"/>
               </a:defRPr>
             </a:lvl6pPr>
-            <a:lvl7pPr lvl="6" marR="0" rtl="0" algn="l">
+            <a:lvl7pPr marR="0" lvl="6" algn="l" rtl="0">
               <a:spcBef>
                 <a:spcPts val="0"/>
               </a:spcBef>
@@ -660,7 +667,7 @@
               </a:spcAft>
               <a:buSzPts val="1400"/>
               <a:buNone/>
-              <a:defRPr b="0" i="0" sz="7000" u="none" cap="none" strike="noStrike">
+              <a:defRPr sz="7000" b="0" i="0" u="none" strike="noStrike" cap="none">
                 <a:solidFill>
                   <a:schemeClr val="dk1"/>
                 </a:solidFill>
@@ -670,7 +677,7 @@
                 <a:sym typeface="Calibri"/>
               </a:defRPr>
             </a:lvl7pPr>
-            <a:lvl8pPr lvl="7" marR="0" rtl="0" algn="l">
+            <a:lvl8pPr marR="0" lvl="7" algn="l" rtl="0">
               <a:spcBef>
                 <a:spcPts val="0"/>
               </a:spcBef>
@@ -679,7 +686,7 @@
               </a:spcAft>
               <a:buSzPts val="1400"/>
               <a:buNone/>
-              <a:defRPr b="0" i="0" sz="7000" u="none" cap="none" strike="noStrike">
+              <a:defRPr sz="7000" b="0" i="0" u="none" strike="noStrike" cap="none">
                 <a:solidFill>
                   <a:schemeClr val="dk1"/>
                 </a:solidFill>
@@ -689,7 +696,7 @@
                 <a:sym typeface="Calibri"/>
               </a:defRPr>
             </a:lvl8pPr>
-            <a:lvl9pPr lvl="8" marR="0" rtl="0" algn="l">
+            <a:lvl9pPr marR="0" lvl="8" algn="l" rtl="0">
               <a:spcBef>
                 <a:spcPts val="0"/>
               </a:spcBef>
@@ -698,7 +705,7 @@
               </a:spcAft>
               <a:buSzPts val="1400"/>
               <a:buNone/>
-              <a:defRPr b="0" i="0" sz="7000" u="none" cap="none" strike="noStrike">
+              <a:defRPr sz="7000" b="0" i="0" u="none" strike="noStrike" cap="none">
                 <a:solidFill>
                   <a:schemeClr val="dk1"/>
                 </a:solidFill>
@@ -709,15 +716,19 @@
               </a:defRPr>
             </a:lvl9pPr>
           </a:lstStyle>
-          <a:p/>
+          <a:p>
+            <a:endParaRPr/>
+          </a:p>
         </p:txBody>
       </p:sp>
       <p:sp>
         <p:nvSpPr>
           <p:cNvPr id="5" name="Google Shape;5;n"/>
-          <p:cNvSpPr/>
+          <p:cNvSpPr>
+            <a:spLocks noGrp="1" noRot="1" noChangeAspect="1"/>
+          </p:cNvSpPr>
           <p:nvPr>
-            <p:ph idx="3" type="sldImg"/>
+            <p:ph type="sldImg" idx="3"/>
           </p:nvPr>
         </p:nvSpPr>
         <p:spPr>
@@ -726,9 +737,13 @@
             <a:ext cx="4114800" cy="3086100"/>
           </a:xfrm>
           <a:custGeom>
-            <a:rect b="b" l="l" r="r" t="t"/>
+            <a:avLst/>
+            <a:gdLst/>
+            <a:ahLst/>
+            <a:cxnLst/>
+            <a:rect l="l" t="t" r="r" b="b"/>
             <a:pathLst>
-              <a:path extrusionOk="0" h="120000" w="120000">
+              <a:path w="120000" h="120000" extrusionOk="0">
                 <a:moveTo>
                   <a:pt x="0" y="0"/>
                 </a:moveTo>
@@ -746,23 +761,25 @@
             </a:pathLst>
           </a:custGeom>
           <a:noFill/>
-          <a:ln cap="flat" cmpd="sng" w="12700">
+          <a:ln w="12700" cap="flat" cmpd="sng">
             <a:solidFill>
               <a:srgbClr val="000000"/>
             </a:solidFill>
             <a:prstDash val="solid"/>
             <a:round/>
-            <a:headEnd len="sm" w="sm" type="none"/>
-            <a:tailEnd len="sm" w="sm" type="none"/>
+            <a:headEnd type="none" w="sm" len="sm"/>
+            <a:tailEnd type="none" w="sm" len="sm"/>
           </a:ln>
         </p:spPr>
       </p:sp>
       <p:sp>
         <p:nvSpPr>
           <p:cNvPr id="6" name="Google Shape;6;n"/>
-          <p:cNvSpPr txBox="1"/>
+          <p:cNvSpPr txBox="1">
+            <a:spLocks noGrp="1"/>
+          </p:cNvSpPr>
           <p:nvPr>
-            <p:ph idx="1" type="body"/>
+            <p:ph type="body" idx="1"/>
           </p:nvPr>
         </p:nvSpPr>
         <p:spPr>
@@ -779,9 +796,9 @@
           </a:ln>
         </p:spPr>
         <p:txBody>
-          <a:bodyPr anchorCtr="0" anchor="t" bIns="45700" lIns="91425" spcFirstLastPara="1" rIns="91425" wrap="square" tIns="45700"/>
+          <a:bodyPr spcFirstLastPara="1" wrap="square" lIns="91425" tIns="45700" rIns="91425" bIns="45700" anchor="t" anchorCtr="0"/>
           <a:lstStyle>
-            <a:lvl1pPr indent="-228600" lvl="0" marL="457200" marR="0" rtl="0" algn="l">
+            <a:lvl1pPr marL="457200" marR="0" lvl="0" indent="-228600" algn="l" rtl="0">
               <a:spcBef>
                 <a:spcPts val="0"/>
               </a:spcBef>
@@ -790,7 +807,7 @@
               </a:spcAft>
               <a:buSzPts val="1400"/>
               <a:buNone/>
-              <a:defRPr b="0" i="0" sz="4800" u="none" cap="none" strike="noStrike">
+              <a:defRPr sz="4800" b="0" i="0" u="none" strike="noStrike" cap="none">
                 <a:solidFill>
                   <a:schemeClr val="dk1"/>
                 </a:solidFill>
@@ -800,7 +817,7 @@
                 <a:sym typeface="Arial"/>
               </a:defRPr>
             </a:lvl1pPr>
-            <a:lvl2pPr indent="-228600" lvl="1" marL="914400" marR="0" rtl="0" algn="l">
+            <a:lvl2pPr marL="914400" marR="0" lvl="1" indent="-228600" algn="l" rtl="0">
               <a:spcBef>
                 <a:spcPts val="0"/>
               </a:spcBef>
@@ -809,7 +826,7 @@
               </a:spcAft>
               <a:buSzPts val="1400"/>
               <a:buNone/>
-              <a:defRPr b="0" i="0" sz="4800" u="none" cap="none" strike="noStrike">
+              <a:defRPr sz="4800" b="0" i="0" u="none" strike="noStrike" cap="none">
                 <a:solidFill>
                   <a:schemeClr val="dk1"/>
                 </a:solidFill>
@@ -819,7 +836,7 @@
                 <a:sym typeface="Arial"/>
               </a:defRPr>
             </a:lvl2pPr>
-            <a:lvl3pPr indent="-228600" lvl="2" marL="1371600" marR="0" rtl="0" algn="l">
+            <a:lvl3pPr marL="1371600" marR="0" lvl="2" indent="-228600" algn="l" rtl="0">
               <a:spcBef>
                 <a:spcPts val="0"/>
               </a:spcBef>
@@ -828,7 +845,7 @@
               </a:spcAft>
               <a:buSzPts val="1400"/>
               <a:buNone/>
-              <a:defRPr b="0" i="0" sz="4800" u="none" cap="none" strike="noStrike">
+              <a:defRPr sz="4800" b="0" i="0" u="none" strike="noStrike" cap="none">
                 <a:solidFill>
                   <a:schemeClr val="dk1"/>
                 </a:solidFill>
@@ -838,7 +855,7 @@
                 <a:sym typeface="Arial"/>
               </a:defRPr>
             </a:lvl3pPr>
-            <a:lvl4pPr indent="-228600" lvl="3" marL="1828800" marR="0" rtl="0" algn="l">
+            <a:lvl4pPr marL="1828800" marR="0" lvl="3" indent="-228600" algn="l" rtl="0">
               <a:spcBef>
                 <a:spcPts val="0"/>
               </a:spcBef>
@@ -847,7 +864,7 @@
               </a:spcAft>
               <a:buSzPts val="1400"/>
               <a:buNone/>
-              <a:defRPr b="0" i="0" sz="4800" u="none" cap="none" strike="noStrike">
+              <a:defRPr sz="4800" b="0" i="0" u="none" strike="noStrike" cap="none">
                 <a:solidFill>
                   <a:schemeClr val="dk1"/>
                 </a:solidFill>
@@ -857,7 +874,7 @@
                 <a:sym typeface="Arial"/>
               </a:defRPr>
             </a:lvl4pPr>
-            <a:lvl5pPr indent="-228600" lvl="4" marL="2286000" marR="0" rtl="0" algn="l">
+            <a:lvl5pPr marL="2286000" marR="0" lvl="4" indent="-228600" algn="l" rtl="0">
               <a:spcBef>
                 <a:spcPts val="0"/>
               </a:spcBef>
@@ -866,7 +883,7 @@
               </a:spcAft>
               <a:buSzPts val="1400"/>
               <a:buNone/>
-              <a:defRPr b="0" i="0" sz="4800" u="none" cap="none" strike="noStrike">
+              <a:defRPr sz="4800" b="0" i="0" u="none" strike="noStrike" cap="none">
                 <a:solidFill>
                   <a:schemeClr val="dk1"/>
                 </a:solidFill>
@@ -876,7 +893,7 @@
                 <a:sym typeface="Arial"/>
               </a:defRPr>
             </a:lvl5pPr>
-            <a:lvl6pPr indent="-228600" lvl="5" marL="2743200" marR="0" rtl="0" algn="l">
+            <a:lvl6pPr marL="2743200" marR="0" lvl="5" indent="-228600" algn="l" rtl="0">
               <a:spcBef>
                 <a:spcPts val="0"/>
               </a:spcBef>
@@ -885,7 +902,7 @@
               </a:spcAft>
               <a:buSzPts val="1400"/>
               <a:buNone/>
-              <a:defRPr b="0" i="0" sz="4800" u="none" cap="none" strike="noStrike">
+              <a:defRPr sz="4800" b="0" i="0" u="none" strike="noStrike" cap="none">
                 <a:solidFill>
                   <a:schemeClr val="dk1"/>
                 </a:solidFill>
@@ -895,7 +912,7 @@
                 <a:sym typeface="Calibri"/>
               </a:defRPr>
             </a:lvl6pPr>
-            <a:lvl7pPr indent="-228600" lvl="6" marL="3200400" marR="0" rtl="0" algn="l">
+            <a:lvl7pPr marL="3200400" marR="0" lvl="6" indent="-228600" algn="l" rtl="0">
               <a:spcBef>
                 <a:spcPts val="0"/>
               </a:spcBef>
@@ -904,7 +921,7 @@
               </a:spcAft>
               <a:buSzPts val="1400"/>
               <a:buNone/>
-              <a:defRPr b="0" i="0" sz="4800" u="none" cap="none" strike="noStrike">
+              <a:defRPr sz="4800" b="0" i="0" u="none" strike="noStrike" cap="none">
                 <a:solidFill>
                   <a:schemeClr val="dk1"/>
                 </a:solidFill>
@@ -914,7 +931,7 @@
                 <a:sym typeface="Calibri"/>
               </a:defRPr>
             </a:lvl7pPr>
-            <a:lvl8pPr indent="-228600" lvl="7" marL="3657600" marR="0" rtl="0" algn="l">
+            <a:lvl8pPr marL="3657600" marR="0" lvl="7" indent="-228600" algn="l" rtl="0">
               <a:spcBef>
                 <a:spcPts val="0"/>
               </a:spcBef>
@@ -923,7 +940,7 @@
               </a:spcAft>
               <a:buSzPts val="1400"/>
               <a:buNone/>
-              <a:defRPr b="0" i="0" sz="4800" u="none" cap="none" strike="noStrike">
+              <a:defRPr sz="4800" b="0" i="0" u="none" strike="noStrike" cap="none">
                 <a:solidFill>
                   <a:schemeClr val="dk1"/>
                 </a:solidFill>
@@ -933,7 +950,7 @@
                 <a:sym typeface="Calibri"/>
               </a:defRPr>
             </a:lvl8pPr>
-            <a:lvl9pPr indent="-228600" lvl="8" marL="4114800" marR="0" rtl="0" algn="l">
+            <a:lvl9pPr marL="4114800" marR="0" lvl="8" indent="-228600" algn="l" rtl="0">
               <a:spcBef>
                 <a:spcPts val="0"/>
               </a:spcBef>
@@ -942,7 +959,7 @@
               </a:spcAft>
               <a:buSzPts val="1400"/>
               <a:buNone/>
-              <a:defRPr b="0" i="0" sz="4800" u="none" cap="none" strike="noStrike">
+              <a:defRPr sz="4800" b="0" i="0" u="none" strike="noStrike" cap="none">
                 <a:solidFill>
                   <a:schemeClr val="dk1"/>
                 </a:solidFill>
@@ -953,15 +970,19 @@
               </a:defRPr>
             </a:lvl9pPr>
           </a:lstStyle>
-          <a:p/>
+          <a:p>
+            <a:endParaRPr/>
+          </a:p>
         </p:txBody>
       </p:sp>
       <p:sp>
         <p:nvSpPr>
           <p:cNvPr id="7" name="Google Shape;7;n"/>
-          <p:cNvSpPr txBox="1"/>
+          <p:cNvSpPr txBox="1">
+            <a:spLocks noGrp="1"/>
+          </p:cNvSpPr>
           <p:nvPr>
-            <p:ph idx="11" type="ftr"/>
+            <p:ph type="ftr" idx="11"/>
           </p:nvPr>
         </p:nvSpPr>
         <p:spPr>
@@ -978,9 +999,9 @@
           </a:ln>
         </p:spPr>
         <p:txBody>
-          <a:bodyPr anchorCtr="0" anchor="b" bIns="45700" lIns="91425" spcFirstLastPara="1" rIns="91425" wrap="square" tIns="45700"/>
+          <a:bodyPr spcFirstLastPara="1" wrap="square" lIns="91425" tIns="45700" rIns="91425" bIns="45700" anchor="b" anchorCtr="0"/>
           <a:lstStyle>
-            <a:lvl1pPr lvl="0" marR="0" rtl="0" algn="l">
+            <a:lvl1pPr marR="0" lvl="0" algn="l" rtl="0">
               <a:spcBef>
                 <a:spcPts val="0"/>
               </a:spcBef>
@@ -989,7 +1010,7 @@
               </a:spcAft>
               <a:buSzPts val="1400"/>
               <a:buNone/>
-              <a:defRPr b="0" i="0" sz="1200" u="none" cap="none" strike="noStrike">
+              <a:defRPr sz="1200" b="0" i="0" u="none" strike="noStrike" cap="none">
                 <a:solidFill>
                   <a:schemeClr val="dk1"/>
                 </a:solidFill>
@@ -999,7 +1020,7 @@
                 <a:sym typeface="Arial"/>
               </a:defRPr>
             </a:lvl1pPr>
-            <a:lvl2pPr lvl="1" marR="0" rtl="0" algn="l">
+            <a:lvl2pPr marR="0" lvl="1" algn="l" rtl="0">
               <a:spcBef>
                 <a:spcPts val="0"/>
               </a:spcBef>
@@ -1008,7 +1029,7 @@
               </a:spcAft>
               <a:buSzPts val="1400"/>
               <a:buNone/>
-              <a:defRPr b="0" i="0" sz="7000" u="none" cap="none" strike="noStrike">
+              <a:defRPr sz="7000" b="0" i="0" u="none" strike="noStrike" cap="none">
                 <a:solidFill>
                   <a:schemeClr val="dk1"/>
                 </a:solidFill>
@@ -1018,7 +1039,7 @@
                 <a:sym typeface="Calibri"/>
               </a:defRPr>
             </a:lvl2pPr>
-            <a:lvl3pPr lvl="2" marR="0" rtl="0" algn="l">
+            <a:lvl3pPr marR="0" lvl="2" algn="l" rtl="0">
               <a:spcBef>
                 <a:spcPts val="0"/>
               </a:spcBef>
@@ -1027,7 +1048,7 @@
               </a:spcAft>
               <a:buSzPts val="1400"/>
               <a:buNone/>
-              <a:defRPr b="0" i="0" sz="7000" u="none" cap="none" strike="noStrike">
+              <a:defRPr sz="7000" b="0" i="0" u="none" strike="noStrike" cap="none">
                 <a:solidFill>
                   <a:schemeClr val="dk1"/>
                 </a:solidFill>
@@ -1037,7 +1058,7 @@
                 <a:sym typeface="Calibri"/>
               </a:defRPr>
             </a:lvl3pPr>
-            <a:lvl4pPr lvl="3" marR="0" rtl="0" algn="l">
+            <a:lvl4pPr marR="0" lvl="3" algn="l" rtl="0">
               <a:spcBef>
                 <a:spcPts val="0"/>
               </a:spcBef>
@@ -1046,7 +1067,7 @@
               </a:spcAft>
               <a:buSzPts val="1400"/>
               <a:buNone/>
-              <a:defRPr b="0" i="0" sz="7000" u="none" cap="none" strike="noStrike">
+              <a:defRPr sz="7000" b="0" i="0" u="none" strike="noStrike" cap="none">
                 <a:solidFill>
                   <a:schemeClr val="dk1"/>
                 </a:solidFill>
@@ -1056,7 +1077,7 @@
                 <a:sym typeface="Calibri"/>
               </a:defRPr>
             </a:lvl4pPr>
-            <a:lvl5pPr lvl="4" marR="0" rtl="0" algn="l">
+            <a:lvl5pPr marR="0" lvl="4" algn="l" rtl="0">
               <a:spcBef>
                 <a:spcPts val="0"/>
               </a:spcBef>
@@ -1065,7 +1086,7 @@
               </a:spcAft>
               <a:buSzPts val="1400"/>
               <a:buNone/>
-              <a:defRPr b="0" i="0" sz="7000" u="none" cap="none" strike="noStrike">
+              <a:defRPr sz="7000" b="0" i="0" u="none" strike="noStrike" cap="none">
                 <a:solidFill>
                   <a:schemeClr val="dk1"/>
                 </a:solidFill>
@@ -1075,7 +1096,7 @@
                 <a:sym typeface="Calibri"/>
               </a:defRPr>
             </a:lvl5pPr>
-            <a:lvl6pPr lvl="5" marR="0" rtl="0" algn="l">
+            <a:lvl6pPr marR="0" lvl="5" algn="l" rtl="0">
               <a:spcBef>
                 <a:spcPts val="0"/>
               </a:spcBef>
@@ -1084,7 +1105,7 @@
               </a:spcAft>
               <a:buSzPts val="1400"/>
               <a:buNone/>
-              <a:defRPr b="0" i="0" sz="7000" u="none" cap="none" strike="noStrike">
+              <a:defRPr sz="7000" b="0" i="0" u="none" strike="noStrike" cap="none">
                 <a:solidFill>
                   <a:schemeClr val="dk1"/>
                 </a:solidFill>
@@ -1094,7 +1115,7 @@
                 <a:sym typeface="Calibri"/>
               </a:defRPr>
             </a:lvl6pPr>
-            <a:lvl7pPr lvl="6" marR="0" rtl="0" algn="l">
+            <a:lvl7pPr marR="0" lvl="6" algn="l" rtl="0">
               <a:spcBef>
                 <a:spcPts val="0"/>
               </a:spcBef>
@@ -1103,7 +1124,7 @@
               </a:spcAft>
               <a:buSzPts val="1400"/>
               <a:buNone/>
-              <a:defRPr b="0" i="0" sz="7000" u="none" cap="none" strike="noStrike">
+              <a:defRPr sz="7000" b="0" i="0" u="none" strike="noStrike" cap="none">
                 <a:solidFill>
                   <a:schemeClr val="dk1"/>
                 </a:solidFill>
@@ -1113,7 +1134,7 @@
                 <a:sym typeface="Calibri"/>
               </a:defRPr>
             </a:lvl7pPr>
-            <a:lvl8pPr lvl="7" marR="0" rtl="0" algn="l">
+            <a:lvl8pPr marR="0" lvl="7" algn="l" rtl="0">
               <a:spcBef>
                 <a:spcPts val="0"/>
               </a:spcBef>
@@ -1122,7 +1143,7 @@
               </a:spcAft>
               <a:buSzPts val="1400"/>
               <a:buNone/>
-              <a:defRPr b="0" i="0" sz="7000" u="none" cap="none" strike="noStrike">
+              <a:defRPr sz="7000" b="0" i="0" u="none" strike="noStrike" cap="none">
                 <a:solidFill>
                   <a:schemeClr val="dk1"/>
                 </a:solidFill>
@@ -1132,7 +1153,7 @@
                 <a:sym typeface="Calibri"/>
               </a:defRPr>
             </a:lvl8pPr>
-            <a:lvl9pPr lvl="8" marR="0" rtl="0" algn="l">
+            <a:lvl9pPr marR="0" lvl="8" algn="l" rtl="0">
               <a:spcBef>
                 <a:spcPts val="0"/>
               </a:spcBef>
@@ -1141,7 +1162,7 @@
               </a:spcAft>
               <a:buSzPts val="1400"/>
               <a:buNone/>
-              <a:defRPr b="0" i="0" sz="7000" u="none" cap="none" strike="noStrike">
+              <a:defRPr sz="7000" b="0" i="0" u="none" strike="noStrike" cap="none">
                 <a:solidFill>
                   <a:schemeClr val="dk1"/>
                 </a:solidFill>
@@ -1152,15 +1173,19 @@
               </a:defRPr>
             </a:lvl9pPr>
           </a:lstStyle>
-          <a:p/>
+          <a:p>
+            <a:endParaRPr/>
+          </a:p>
         </p:txBody>
       </p:sp>
       <p:sp>
         <p:nvSpPr>
           <p:cNvPr id="8" name="Google Shape;8;n"/>
-          <p:cNvSpPr txBox="1"/>
+          <p:cNvSpPr txBox="1">
+            <a:spLocks noGrp="1"/>
+          </p:cNvSpPr>
           <p:nvPr>
-            <p:ph idx="12" type="sldNum"/>
+            <p:ph type="sldNum" idx="12"/>
           </p:nvPr>
         </p:nvSpPr>
         <p:spPr>
@@ -1177,12 +1202,12 @@
           </a:ln>
         </p:spPr>
         <p:txBody>
-          <a:bodyPr anchorCtr="0" anchor="b" bIns="45700" lIns="91425" spcFirstLastPara="1" rIns="91425" wrap="square" tIns="45700">
+          <a:bodyPr spcFirstLastPara="1" wrap="square" lIns="91425" tIns="45700" rIns="91425" bIns="45700" anchor="b" anchorCtr="0">
             <a:noAutofit/>
           </a:bodyPr>
           <a:lstStyle/>
           <a:p>
-            <a:pPr indent="0" lvl="0" marL="0" marR="0" rtl="0" algn="r">
+            <a:pPr marL="0" marR="0" lvl="0" indent="0" algn="r" rtl="0">
               <a:spcBef>
                 <a:spcPts val="0"/>
               </a:spcBef>
@@ -1192,7 +1217,7 @@
               <a:buNone/>
             </a:pPr>
             <a:fld id="{00000000-1234-1234-1234-123412341234}" type="slidenum">
-              <a:rPr b="0" i="0" lang="en-US" sz="1200" u="none" cap="none" strike="noStrike">
+              <a:rPr lang="en-US" sz="1200" b="0" i="0" u="none" strike="noStrike" cap="none">
                 <a:solidFill>
                   <a:schemeClr val="dk1"/>
                 </a:solidFill>
@@ -1203,7 +1228,7 @@
               </a:rPr>
               <a:t>‹#›</a:t>
             </a:fld>
-            <a:endParaRPr b="0" i="0" sz="1200" u="none" cap="none" strike="noStrike">
+            <a:endParaRPr sz="1200" b="0" i="0" u="none" strike="noStrike" cap="none">
               <a:solidFill>
                 <a:schemeClr val="dk1"/>
               </a:solidFill>
@@ -1217,9 +1242,9 @@
       </p:sp>
     </p:spTree>
   </p:cSld>
-  <p:clrMap accent1="accent1" accent2="accent2" accent3="accent3" accent4="accent4" accent5="accent5" accent6="accent6" bg1="lt1" bg2="dk2" tx1="dk1" tx2="lt2" folHlink="folHlink" hlink="hlink"/>
+  <p:clrMap bg1="lt1" tx1="dk1" bg2="dk2" tx2="lt2" accent1="accent1" accent2="accent2" accent3="accent3" accent4="accent4" accent5="accent5" accent6="accent6" hlink="hlink" folHlink="folHlink"/>
   <p:notesStyle>
-    <a:defPPr lvl="0" marR="0" rtl="0" algn="l">
+    <a:defPPr marR="0" lvl="0" algn="l" rtl="0">
       <a:lnSpc>
         <a:spcPct val="100000"/>
       </a:lnSpc>
@@ -1230,7 +1255,7 @@
         <a:spcPts val="0"/>
       </a:spcAft>
     </a:defPPr>
-    <a:lvl1pPr lvl="0" marR="0" rtl="0" algn="l">
+    <a:lvl1pPr marR="0" lvl="0" algn="l" rtl="0">
       <a:lnSpc>
         <a:spcPct val="100000"/>
       </a:lnSpc>
@@ -1244,7 +1269,7 @@
         <a:srgbClr val="000000"/>
       </a:buClr>
       <a:buFont typeface="Arial"/>
-      <a:defRPr b="0" i="0" sz="1400" u="none" cap="none" strike="noStrike">
+      <a:defRPr sz="1400" b="0" i="0" u="none" strike="noStrike" cap="none">
         <a:solidFill>
           <a:srgbClr val="000000"/>
         </a:solidFill>
@@ -1254,7 +1279,7 @@
         <a:sym typeface="Arial"/>
       </a:defRPr>
     </a:lvl1pPr>
-    <a:lvl2pPr lvl="1" marR="0" rtl="0" algn="l">
+    <a:lvl2pPr marR="0" lvl="1" algn="l" rtl="0">
       <a:lnSpc>
         <a:spcPct val="100000"/>
       </a:lnSpc>
@@ -1268,7 +1293,7 @@
         <a:srgbClr val="000000"/>
       </a:buClr>
       <a:buFont typeface="Arial"/>
-      <a:defRPr b="0" i="0" sz="1400" u="none" cap="none" strike="noStrike">
+      <a:defRPr sz="1400" b="0" i="0" u="none" strike="noStrike" cap="none">
         <a:solidFill>
           <a:srgbClr val="000000"/>
         </a:solidFill>
@@ -1278,7 +1303,7 @@
         <a:sym typeface="Arial"/>
       </a:defRPr>
     </a:lvl2pPr>
-    <a:lvl3pPr lvl="2" marR="0" rtl="0" algn="l">
+    <a:lvl3pPr marR="0" lvl="2" algn="l" rtl="0">
       <a:lnSpc>
         <a:spcPct val="100000"/>
       </a:lnSpc>
@@ -1292,7 +1317,7 @@
         <a:srgbClr val="000000"/>
       </a:buClr>
       <a:buFont typeface="Arial"/>
-      <a:defRPr b="0" i="0" sz="1400" u="none" cap="none" strike="noStrike">
+      <a:defRPr sz="1400" b="0" i="0" u="none" strike="noStrike" cap="none">
         <a:solidFill>
           <a:srgbClr val="000000"/>
         </a:solidFill>
@@ -1302,7 +1327,7 @@
         <a:sym typeface="Arial"/>
       </a:defRPr>
     </a:lvl3pPr>
-    <a:lvl4pPr lvl="3" marR="0" rtl="0" algn="l">
+    <a:lvl4pPr marR="0" lvl="3" algn="l" rtl="0">
       <a:lnSpc>
         <a:spcPct val="100000"/>
       </a:lnSpc>
@@ -1316,7 +1341,7 @@
         <a:srgbClr val="000000"/>
       </a:buClr>
       <a:buFont typeface="Arial"/>
-      <a:defRPr b="0" i="0" sz="1400" u="none" cap="none" strike="noStrike">
+      <a:defRPr sz="1400" b="0" i="0" u="none" strike="noStrike" cap="none">
         <a:solidFill>
           <a:srgbClr val="000000"/>
         </a:solidFill>
@@ -1326,7 +1351,7 @@
         <a:sym typeface="Arial"/>
       </a:defRPr>
     </a:lvl4pPr>
-    <a:lvl5pPr lvl="4" marR="0" rtl="0" algn="l">
+    <a:lvl5pPr marR="0" lvl="4" algn="l" rtl="0">
       <a:lnSpc>
         <a:spcPct val="100000"/>
       </a:lnSpc>
@@ -1340,7 +1365,7 @@
         <a:srgbClr val="000000"/>
       </a:buClr>
       <a:buFont typeface="Arial"/>
-      <a:defRPr b="0" i="0" sz="1400" u="none" cap="none" strike="noStrike">
+      <a:defRPr sz="1400" b="0" i="0" u="none" strike="noStrike" cap="none">
         <a:solidFill>
           <a:srgbClr val="000000"/>
         </a:solidFill>
@@ -1350,7 +1375,7 @@
         <a:sym typeface="Arial"/>
       </a:defRPr>
     </a:lvl5pPr>
-    <a:lvl6pPr lvl="5" marR="0" rtl="0" algn="l">
+    <a:lvl6pPr marR="0" lvl="5" algn="l" rtl="0">
       <a:lnSpc>
         <a:spcPct val="100000"/>
       </a:lnSpc>
@@ -1364,7 +1389,7 @@
         <a:srgbClr val="000000"/>
       </a:buClr>
       <a:buFont typeface="Arial"/>
-      <a:defRPr b="0" i="0" sz="1400" u="none" cap="none" strike="noStrike">
+      <a:defRPr sz="1400" b="0" i="0" u="none" strike="noStrike" cap="none">
         <a:solidFill>
           <a:srgbClr val="000000"/>
         </a:solidFill>
@@ -1374,7 +1399,7 @@
         <a:sym typeface="Arial"/>
       </a:defRPr>
     </a:lvl6pPr>
-    <a:lvl7pPr lvl="6" marR="0" rtl="0" algn="l">
+    <a:lvl7pPr marR="0" lvl="6" algn="l" rtl="0">
       <a:lnSpc>
         <a:spcPct val="100000"/>
       </a:lnSpc>
@@ -1388,7 +1413,7 @@
         <a:srgbClr val="000000"/>
       </a:buClr>
       <a:buFont typeface="Arial"/>
-      <a:defRPr b="0" i="0" sz="1400" u="none" cap="none" strike="noStrike">
+      <a:defRPr sz="1400" b="0" i="0" u="none" strike="noStrike" cap="none">
         <a:solidFill>
           <a:srgbClr val="000000"/>
         </a:solidFill>
@@ -1398,7 +1423,7 @@
         <a:sym typeface="Arial"/>
       </a:defRPr>
     </a:lvl7pPr>
-    <a:lvl8pPr lvl="7" marR="0" rtl="0" algn="l">
+    <a:lvl8pPr marR="0" lvl="7" algn="l" rtl="0">
       <a:lnSpc>
         <a:spcPct val="100000"/>
       </a:lnSpc>
@@ -1412,7 +1437,7 @@
         <a:srgbClr val="000000"/>
       </a:buClr>
       <a:buFont typeface="Arial"/>
-      <a:defRPr b="0" i="0" sz="1400" u="none" cap="none" strike="noStrike">
+      <a:defRPr sz="1400" b="0" i="0" u="none" strike="noStrike" cap="none">
         <a:solidFill>
           <a:srgbClr val="000000"/>
         </a:solidFill>
@@ -1422,7 +1447,7 @@
         <a:sym typeface="Arial"/>
       </a:defRPr>
     </a:lvl8pPr>
-    <a:lvl9pPr lvl="8" marR="0" rtl="0" algn="l">
+    <a:lvl9pPr marR="0" lvl="8" algn="l" rtl="0">
       <a:lnSpc>
         <a:spcPct val="100000"/>
       </a:lnSpc>
@@ -1436,7 +1461,7 @@
         <a:srgbClr val="000000"/>
       </a:buClr>
       <a:buFont typeface="Arial"/>
-      <a:defRPr b="0" i="0" sz="1400" u="none" cap="none" strike="noStrike">
+      <a:defRPr sz="1400" b="0" i="0" u="none" strike="noStrike" cap="none">
         <a:solidFill>
           <a:srgbClr val="000000"/>
         </a:solidFill>
@@ -1451,11 +1476,11 @@
 </file>
 
 <file path=ppt/notesSlides/notesSlide1.xml><?xml version="1.0" encoding="utf-8"?>
-<p:notes xmlns:a="http://schemas.openxmlformats.org/drawingml/2006/main" xmlns:r="http://schemas.openxmlformats.org/officeDocument/2006/relationships" xmlns:mc="http://schemas.openxmlformats.org/markup-compatibility/2006" xmlns:mv="urn:schemas-microsoft-com:mac:vml" xmlns:p="http://schemas.openxmlformats.org/presentationml/2006/main" xmlns:c="http://schemas.openxmlformats.org/drawingml/2006/chart" xmlns:dgm="http://schemas.openxmlformats.org/drawingml/2006/diagram" xmlns:o="urn:schemas-microsoft-com:office:office" xmlns:v="urn:schemas-microsoft-com:vml" xmlns:pvml="urn:schemas-microsoft-com:office:powerpoint" xmlns:com="http://schemas.openxmlformats.org/drawingml/2006/compatibility" xmlns:p14="http://schemas.microsoft.com/office/powerpoint/2010/main" xmlns:p15="http://schemas.microsoft.com/office/powerpoint/2012/main" showMasterPhAnim="0" showMasterSp="0">
+<p:notes xmlns:a="http://schemas.openxmlformats.org/drawingml/2006/main" xmlns:r="http://schemas.openxmlformats.org/officeDocument/2006/relationships" xmlns:p="http://schemas.openxmlformats.org/presentationml/2006/main" showMasterSp="0" showMasterPhAnim="0">
   <p:cSld>
     <p:spTree>
       <p:nvGrpSpPr>
-        <p:cNvPr id="31" name="Shape 31"/>
+        <p:cNvPr id="1" name="Shape 31"/>
         <p:cNvGrpSpPr/>
         <p:nvPr/>
       </p:nvGrpSpPr>
@@ -1470,9 +1495,11 @@
       <p:sp>
         <p:nvSpPr>
           <p:cNvPr id="32" name="Google Shape;32;p1:notes"/>
-          <p:cNvSpPr txBox="1"/>
+          <p:cNvSpPr txBox="1">
+            <a:spLocks noGrp="1"/>
+          </p:cNvSpPr>
           <p:nvPr>
-            <p:ph idx="1" type="body"/>
+            <p:ph type="body" idx="1"/>
           </p:nvPr>
         </p:nvSpPr>
         <p:spPr>
@@ -1485,12 +1512,12 @@
           </a:prstGeom>
         </p:spPr>
         <p:txBody>
-          <a:bodyPr anchorCtr="0" anchor="t" bIns="45700" lIns="91425" spcFirstLastPara="1" rIns="91425" wrap="square" tIns="45700">
+          <a:bodyPr spcFirstLastPara="1" wrap="square" lIns="91425" tIns="45700" rIns="91425" bIns="45700" anchor="t" anchorCtr="0">
             <a:noAutofit/>
           </a:bodyPr>
           <a:lstStyle/>
           <a:p>
-            <a:pPr indent="0" lvl="0" marL="0" rtl="0" algn="l">
+            <a:pPr marL="0" lvl="0" indent="0" algn="l" rtl="0">
               <a:spcBef>
                 <a:spcPts val="0"/>
               </a:spcBef>
@@ -1499,9 +1526,6 @@
               </a:spcAft>
               <a:buNone/>
             </a:pPr>
-            <a:r>
-              <a:t/>
-            </a:r>
             <a:endParaRPr/>
           </a:p>
         </p:txBody>
@@ -1509,9 +1533,11 @@
       <p:sp>
         <p:nvSpPr>
           <p:cNvPr id="33" name="Google Shape;33;p1:notes"/>
-          <p:cNvSpPr/>
+          <p:cNvSpPr>
+            <a:spLocks noGrp="1" noRot="1" noChangeAspect="1"/>
+          </p:cNvSpPr>
           <p:nvPr>
-            <p:ph idx="2" type="sldImg"/>
+            <p:ph type="sldImg" idx="2"/>
           </p:nvPr>
         </p:nvSpPr>
         <p:spPr>
@@ -1520,9 +1546,13 @@
             <a:ext cx="4114800" cy="3086100"/>
           </a:xfrm>
           <a:custGeom>
-            <a:rect b="b" l="l" r="r" t="t"/>
+            <a:avLst/>
+            <a:gdLst/>
+            <a:ahLst/>
+            <a:cxnLst/>
+            <a:rect l="l" t="t" r="r" b="b"/>
             <a:pathLst>
-              <a:path extrusionOk="0" h="120000" w="120000">
+              <a:path w="120000" h="120000" extrusionOk="0">
                 <a:moveTo>
                   <a:pt x="0" y="0"/>
                 </a:moveTo>
@@ -1550,11 +1580,11 @@
 </file>
 
 <file path=ppt/slideLayouts/slideLayout1.xml><?xml version="1.0" encoding="utf-8"?>
-<p:sldLayout xmlns:a="http://schemas.openxmlformats.org/drawingml/2006/main" xmlns:r="http://schemas.openxmlformats.org/officeDocument/2006/relationships" xmlns:mc="http://schemas.openxmlformats.org/markup-compatibility/2006" xmlns:mv="urn:schemas-microsoft-com:mac:vml" xmlns:p="http://schemas.openxmlformats.org/presentationml/2006/main" xmlns:c="http://schemas.openxmlformats.org/drawingml/2006/chart" xmlns:dgm="http://schemas.openxmlformats.org/drawingml/2006/diagram" xmlns:o="urn:schemas-microsoft-com:office:office" xmlns:v="urn:schemas-microsoft-com:vml" xmlns:pvml="urn:schemas-microsoft-com:office:powerpoint" xmlns:com="http://schemas.openxmlformats.org/drawingml/2006/compatibility" xmlns:p14="http://schemas.microsoft.com/office/powerpoint/2010/main" xmlns:p15="http://schemas.microsoft.com/office/powerpoint/2012/main" matchingName="Title Slide">
+<p:sldLayout xmlns:a="http://schemas.openxmlformats.org/drawingml/2006/main" xmlns:r="http://schemas.openxmlformats.org/officeDocument/2006/relationships" xmlns:p="http://schemas.openxmlformats.org/presentationml/2006/main" matchingName="Title Slide">
   <p:cSld name="Title Slide">
     <p:spTree>
       <p:nvGrpSpPr>
-        <p:cNvPr id="28" name="Shape 28"/>
+        <p:cNvPr id="1" name="Shape 28"/>
         <p:cNvGrpSpPr/>
         <p:nvPr/>
       </p:nvGrpSpPr>
@@ -1569,9 +1599,11 @@
       <p:sp>
         <p:nvSpPr>
           <p:cNvPr id="29" name="Google Shape;29;p2"/>
-          <p:cNvSpPr/>
+          <p:cNvSpPr>
+            <a:spLocks noGrp="1"/>
+          </p:cNvSpPr>
           <p:nvPr>
-            <p:ph idx="2" type="pic"/>
+            <p:ph type="pic" idx="2"/>
           </p:nvPr>
         </p:nvSpPr>
         <p:spPr>
@@ -1588,9 +1620,9 @@
           </a:ln>
         </p:spPr>
         <p:txBody>
-          <a:bodyPr anchorCtr="0" anchor="t" bIns="45700" lIns="91425" spcFirstLastPara="1" rIns="91425" wrap="square" tIns="45700"/>
+          <a:bodyPr spcFirstLastPara="1" wrap="square" lIns="91425" tIns="45700" rIns="91425" bIns="45700" anchor="t" anchorCtr="0"/>
           <a:lstStyle>
-            <a:lvl1pPr lvl="0" marR="0" rtl="0" algn="l">
+            <a:lvl1pPr marR="0" lvl="0" algn="l" rtl="0">
               <a:lnSpc>
                 <a:spcPct val="90000"/>
               </a:lnSpc>
@@ -1606,7 +1638,7 @@
               <a:buSzPts val="9600"/>
               <a:buFont typeface="Arial"/>
               <a:buChar char="•"/>
-              <a:defRPr b="0" i="0" sz="9600" u="none" cap="none" strike="noStrike">
+              <a:defRPr sz="9600" b="0" i="0" u="none" strike="noStrike" cap="none">
                 <a:solidFill>
                   <a:schemeClr val="dk1"/>
                 </a:solidFill>
@@ -1616,7 +1648,7 @@
                 <a:sym typeface="Verdana"/>
               </a:defRPr>
             </a:lvl1pPr>
-            <a:lvl2pPr lvl="1" marR="0" rtl="0" algn="l">
+            <a:lvl2pPr marR="0" lvl="1" algn="l" rtl="0">
               <a:lnSpc>
                 <a:spcPct val="90000"/>
               </a:lnSpc>
@@ -1632,7 +1664,7 @@
               <a:buSzPts val="11520"/>
               <a:buFont typeface="Arial"/>
               <a:buChar char="•"/>
-              <a:defRPr b="0" i="0" sz="11520" u="none" cap="none" strike="noStrike">
+              <a:defRPr sz="11520" b="0" i="0" u="none" strike="noStrike" cap="none">
                 <a:solidFill>
                   <a:schemeClr val="dk1"/>
                 </a:solidFill>
@@ -1642,7 +1674,7 @@
                 <a:sym typeface="Calibri"/>
               </a:defRPr>
             </a:lvl2pPr>
-            <a:lvl3pPr lvl="2" marR="0" rtl="0" algn="l">
+            <a:lvl3pPr marR="0" lvl="2" algn="l" rtl="0">
               <a:lnSpc>
                 <a:spcPct val="90000"/>
               </a:lnSpc>
@@ -1658,7 +1690,7 @@
               <a:buSzPts val="9600"/>
               <a:buFont typeface="Arial"/>
               <a:buChar char="•"/>
-              <a:defRPr b="0" i="0" sz="9600" u="none" cap="none" strike="noStrike">
+              <a:defRPr sz="9600" b="0" i="0" u="none" strike="noStrike" cap="none">
                 <a:solidFill>
                   <a:schemeClr val="dk1"/>
                 </a:solidFill>
@@ -1668,7 +1700,7 @@
                 <a:sym typeface="Calibri"/>
               </a:defRPr>
             </a:lvl3pPr>
-            <a:lvl4pPr lvl="3" marR="0" rtl="0" algn="l">
+            <a:lvl4pPr marR="0" lvl="3" algn="l" rtl="0">
               <a:lnSpc>
                 <a:spcPct val="90000"/>
               </a:lnSpc>
@@ -1684,7 +1716,7 @@
               <a:buSzPts val="8640"/>
               <a:buFont typeface="Arial"/>
               <a:buChar char="•"/>
-              <a:defRPr b="0" i="0" sz="8640" u="none" cap="none" strike="noStrike">
+              <a:defRPr sz="8640" b="0" i="0" u="none" strike="noStrike" cap="none">
                 <a:solidFill>
                   <a:schemeClr val="dk1"/>
                 </a:solidFill>
@@ -1694,7 +1726,7 @@
                 <a:sym typeface="Calibri"/>
               </a:defRPr>
             </a:lvl4pPr>
-            <a:lvl5pPr lvl="4" marR="0" rtl="0" algn="l">
+            <a:lvl5pPr marR="0" lvl="4" algn="l" rtl="0">
               <a:lnSpc>
                 <a:spcPct val="90000"/>
               </a:lnSpc>
@@ -1710,7 +1742,7 @@
               <a:buSzPts val="8640"/>
               <a:buFont typeface="Arial"/>
               <a:buChar char="•"/>
-              <a:defRPr b="0" i="0" sz="8640" u="none" cap="none" strike="noStrike">
+              <a:defRPr sz="8640" b="0" i="0" u="none" strike="noStrike" cap="none">
                 <a:solidFill>
                   <a:schemeClr val="dk1"/>
                 </a:solidFill>
@@ -1720,7 +1752,7 @@
                 <a:sym typeface="Calibri"/>
               </a:defRPr>
             </a:lvl5pPr>
-            <a:lvl6pPr lvl="5" marR="0" rtl="0" algn="l">
+            <a:lvl6pPr marR="0" lvl="5" algn="l" rtl="0">
               <a:lnSpc>
                 <a:spcPct val="90000"/>
               </a:lnSpc>
@@ -1736,7 +1768,7 @@
               <a:buSzPts val="8640"/>
               <a:buFont typeface="Arial"/>
               <a:buChar char="•"/>
-              <a:defRPr b="0" i="0" sz="8640" u="none" cap="none" strike="noStrike">
+              <a:defRPr sz="8640" b="0" i="0" u="none" strike="noStrike" cap="none">
                 <a:solidFill>
                   <a:schemeClr val="dk1"/>
                 </a:solidFill>
@@ -1746,7 +1778,7 @@
                 <a:sym typeface="Calibri"/>
               </a:defRPr>
             </a:lvl6pPr>
-            <a:lvl7pPr lvl="6" marR="0" rtl="0" algn="l">
+            <a:lvl7pPr marR="0" lvl="6" algn="l" rtl="0">
               <a:lnSpc>
                 <a:spcPct val="90000"/>
               </a:lnSpc>
@@ -1762,7 +1794,7 @@
               <a:buSzPts val="8640"/>
               <a:buFont typeface="Arial"/>
               <a:buChar char="•"/>
-              <a:defRPr b="0" i="0" sz="8640" u="none" cap="none" strike="noStrike">
+              <a:defRPr sz="8640" b="0" i="0" u="none" strike="noStrike" cap="none">
                 <a:solidFill>
                   <a:schemeClr val="dk1"/>
                 </a:solidFill>
@@ -1772,7 +1804,7 @@
                 <a:sym typeface="Calibri"/>
               </a:defRPr>
             </a:lvl7pPr>
-            <a:lvl8pPr lvl="7" marR="0" rtl="0" algn="l">
+            <a:lvl8pPr marR="0" lvl="7" algn="l" rtl="0">
               <a:lnSpc>
                 <a:spcPct val="90000"/>
               </a:lnSpc>
@@ -1788,7 +1820,7 @@
               <a:buSzPts val="8640"/>
               <a:buFont typeface="Arial"/>
               <a:buChar char="•"/>
-              <a:defRPr b="0" i="0" sz="8640" u="none" cap="none" strike="noStrike">
+              <a:defRPr sz="8640" b="0" i="0" u="none" strike="noStrike" cap="none">
                 <a:solidFill>
                   <a:schemeClr val="dk1"/>
                 </a:solidFill>
@@ -1798,7 +1830,7 @@
                 <a:sym typeface="Calibri"/>
               </a:defRPr>
             </a:lvl8pPr>
-            <a:lvl9pPr lvl="8" marR="0" rtl="0" algn="l">
+            <a:lvl9pPr marR="0" lvl="8" algn="l" rtl="0">
               <a:lnSpc>
                 <a:spcPct val="90000"/>
               </a:lnSpc>
@@ -1814,7 +1846,7 @@
               <a:buSzPts val="8640"/>
               <a:buFont typeface="Arial"/>
               <a:buChar char="•"/>
-              <a:defRPr b="0" i="0" sz="8640" u="none" cap="none" strike="noStrike">
+              <a:defRPr sz="8640" b="0" i="0" u="none" strike="noStrike" cap="none">
                 <a:solidFill>
                   <a:schemeClr val="dk1"/>
                 </a:solidFill>
@@ -1825,15 +1857,19 @@
               </a:defRPr>
             </a:lvl9pPr>
           </a:lstStyle>
-          <a:p/>
+          <a:p>
+            <a:endParaRPr/>
+          </a:p>
         </p:txBody>
       </p:sp>
       <p:sp>
         <p:nvSpPr>
           <p:cNvPr id="30" name="Google Shape;30;p2"/>
-          <p:cNvSpPr/>
+          <p:cNvSpPr>
+            <a:spLocks noGrp="1"/>
+          </p:cNvSpPr>
           <p:nvPr>
-            <p:ph idx="3" type="pic"/>
+            <p:ph type="pic" idx="3"/>
           </p:nvPr>
         </p:nvSpPr>
         <p:spPr>
@@ -1850,9 +1886,9 @@
           </a:ln>
         </p:spPr>
         <p:txBody>
-          <a:bodyPr anchorCtr="0" anchor="t" bIns="45700" lIns="91425" spcFirstLastPara="1" rIns="91425" wrap="square" tIns="45700"/>
+          <a:bodyPr spcFirstLastPara="1" wrap="square" lIns="91425" tIns="45700" rIns="91425" bIns="45700" anchor="t" anchorCtr="0"/>
           <a:lstStyle>
-            <a:lvl1pPr lvl="0" marR="0" rtl="0" algn="l">
+            <a:lvl1pPr marR="0" lvl="0" algn="l" rtl="0">
               <a:lnSpc>
                 <a:spcPct val="90000"/>
               </a:lnSpc>
@@ -1868,7 +1904,7 @@
               <a:buSzPts val="9600"/>
               <a:buFont typeface="Arial"/>
               <a:buChar char="•"/>
-              <a:defRPr b="0" i="0" sz="9600" u="none" cap="none" strike="noStrike">
+              <a:defRPr sz="9600" b="0" i="0" u="none" strike="noStrike" cap="none">
                 <a:solidFill>
                   <a:schemeClr val="dk1"/>
                 </a:solidFill>
@@ -1878,7 +1914,7 @@
                 <a:sym typeface="Verdana"/>
               </a:defRPr>
             </a:lvl1pPr>
-            <a:lvl2pPr lvl="1" marR="0" rtl="0" algn="l">
+            <a:lvl2pPr marR="0" lvl="1" algn="l" rtl="0">
               <a:lnSpc>
                 <a:spcPct val="90000"/>
               </a:lnSpc>
@@ -1894,7 +1930,7 @@
               <a:buSzPts val="11520"/>
               <a:buFont typeface="Arial"/>
               <a:buChar char="•"/>
-              <a:defRPr b="0" i="0" sz="11520" u="none" cap="none" strike="noStrike">
+              <a:defRPr sz="11520" b="0" i="0" u="none" strike="noStrike" cap="none">
                 <a:solidFill>
                   <a:schemeClr val="dk1"/>
                 </a:solidFill>
@@ -1904,7 +1940,7 @@
                 <a:sym typeface="Calibri"/>
               </a:defRPr>
             </a:lvl2pPr>
-            <a:lvl3pPr lvl="2" marR="0" rtl="0" algn="l">
+            <a:lvl3pPr marR="0" lvl="2" algn="l" rtl="0">
               <a:lnSpc>
                 <a:spcPct val="90000"/>
               </a:lnSpc>
@@ -1920,7 +1956,7 @@
               <a:buSzPts val="9600"/>
               <a:buFont typeface="Arial"/>
               <a:buChar char="•"/>
-              <a:defRPr b="0" i="0" sz="9600" u="none" cap="none" strike="noStrike">
+              <a:defRPr sz="9600" b="0" i="0" u="none" strike="noStrike" cap="none">
                 <a:solidFill>
                   <a:schemeClr val="dk1"/>
                 </a:solidFill>
@@ -1930,7 +1966,7 @@
                 <a:sym typeface="Calibri"/>
               </a:defRPr>
             </a:lvl3pPr>
-            <a:lvl4pPr lvl="3" marR="0" rtl="0" algn="l">
+            <a:lvl4pPr marR="0" lvl="3" algn="l" rtl="0">
               <a:lnSpc>
                 <a:spcPct val="90000"/>
               </a:lnSpc>
@@ -1946,7 +1982,7 @@
               <a:buSzPts val="8640"/>
               <a:buFont typeface="Arial"/>
               <a:buChar char="•"/>
-              <a:defRPr b="0" i="0" sz="8640" u="none" cap="none" strike="noStrike">
+              <a:defRPr sz="8640" b="0" i="0" u="none" strike="noStrike" cap="none">
                 <a:solidFill>
                   <a:schemeClr val="dk1"/>
                 </a:solidFill>
@@ -1956,7 +1992,7 @@
                 <a:sym typeface="Calibri"/>
               </a:defRPr>
             </a:lvl4pPr>
-            <a:lvl5pPr lvl="4" marR="0" rtl="0" algn="l">
+            <a:lvl5pPr marR="0" lvl="4" algn="l" rtl="0">
               <a:lnSpc>
                 <a:spcPct val="90000"/>
               </a:lnSpc>
@@ -1972,7 +2008,7 @@
               <a:buSzPts val="8640"/>
               <a:buFont typeface="Arial"/>
               <a:buChar char="•"/>
-              <a:defRPr b="0" i="0" sz="8640" u="none" cap="none" strike="noStrike">
+              <a:defRPr sz="8640" b="0" i="0" u="none" strike="noStrike" cap="none">
                 <a:solidFill>
                   <a:schemeClr val="dk1"/>
                 </a:solidFill>
@@ -1982,7 +2018,7 @@
                 <a:sym typeface="Calibri"/>
               </a:defRPr>
             </a:lvl5pPr>
-            <a:lvl6pPr lvl="5" marR="0" rtl="0" algn="l">
+            <a:lvl6pPr marR="0" lvl="5" algn="l" rtl="0">
               <a:lnSpc>
                 <a:spcPct val="90000"/>
               </a:lnSpc>
@@ -1998,7 +2034,7 @@
               <a:buSzPts val="8640"/>
               <a:buFont typeface="Arial"/>
               <a:buChar char="•"/>
-              <a:defRPr b="0" i="0" sz="8640" u="none" cap="none" strike="noStrike">
+              <a:defRPr sz="8640" b="0" i="0" u="none" strike="noStrike" cap="none">
                 <a:solidFill>
                   <a:schemeClr val="dk1"/>
                 </a:solidFill>
@@ -2008,7 +2044,7 @@
                 <a:sym typeface="Calibri"/>
               </a:defRPr>
             </a:lvl6pPr>
-            <a:lvl7pPr lvl="6" marR="0" rtl="0" algn="l">
+            <a:lvl7pPr marR="0" lvl="6" algn="l" rtl="0">
               <a:lnSpc>
                 <a:spcPct val="90000"/>
               </a:lnSpc>
@@ -2024,7 +2060,7 @@
               <a:buSzPts val="8640"/>
               <a:buFont typeface="Arial"/>
               <a:buChar char="•"/>
-              <a:defRPr b="0" i="0" sz="8640" u="none" cap="none" strike="noStrike">
+              <a:defRPr sz="8640" b="0" i="0" u="none" strike="noStrike" cap="none">
                 <a:solidFill>
                   <a:schemeClr val="dk1"/>
                 </a:solidFill>
@@ -2034,7 +2070,7 @@
                 <a:sym typeface="Calibri"/>
               </a:defRPr>
             </a:lvl7pPr>
-            <a:lvl8pPr lvl="7" marR="0" rtl="0" algn="l">
+            <a:lvl8pPr marR="0" lvl="7" algn="l" rtl="0">
               <a:lnSpc>
                 <a:spcPct val="90000"/>
               </a:lnSpc>
@@ -2050,7 +2086,7 @@
               <a:buSzPts val="8640"/>
               <a:buFont typeface="Arial"/>
               <a:buChar char="•"/>
-              <a:defRPr b="0" i="0" sz="8640" u="none" cap="none" strike="noStrike">
+              <a:defRPr sz="8640" b="0" i="0" u="none" strike="noStrike" cap="none">
                 <a:solidFill>
                   <a:schemeClr val="dk1"/>
                 </a:solidFill>
@@ -2060,7 +2096,7 @@
                 <a:sym typeface="Calibri"/>
               </a:defRPr>
             </a:lvl8pPr>
-            <a:lvl9pPr lvl="8" marR="0" rtl="0" algn="l">
+            <a:lvl9pPr marR="0" lvl="8" algn="l" rtl="0">
               <a:lnSpc>
                 <a:spcPct val="90000"/>
               </a:lnSpc>
@@ -2076,7 +2112,7 @@
               <a:buSzPts val="8640"/>
               <a:buFont typeface="Arial"/>
               <a:buChar char="•"/>
-              <a:defRPr b="0" i="0" sz="8640" u="none" cap="none" strike="noStrike">
+              <a:defRPr sz="8640" b="0" i="0" u="none" strike="noStrike" cap="none">
                 <a:solidFill>
                   <a:schemeClr val="dk1"/>
                 </a:solidFill>
@@ -2087,7 +2123,9 @@
               </a:defRPr>
             </a:lvl9pPr>
           </a:lstStyle>
-          <a:p/>
+          <a:p>
+            <a:endParaRPr/>
+          </a:p>
         </p:txBody>
       </p:sp>
     </p:spTree>
@@ -2099,18 +2137,19 @@
 </file>
 
 <file path=ppt/slideMasters/slideMaster1.xml><?xml version="1.0" encoding="utf-8"?>
-<p:sldMaster xmlns:a="http://schemas.openxmlformats.org/drawingml/2006/main" xmlns:r="http://schemas.openxmlformats.org/officeDocument/2006/relationships" xmlns:mc="http://schemas.openxmlformats.org/markup-compatibility/2006" xmlns:mv="urn:schemas-microsoft-com:mac:vml" xmlns:p="http://schemas.openxmlformats.org/presentationml/2006/main" xmlns:c="http://schemas.openxmlformats.org/drawingml/2006/chart" xmlns:dgm="http://schemas.openxmlformats.org/drawingml/2006/diagram" xmlns:o="urn:schemas-microsoft-com:office:office" xmlns:v="urn:schemas-microsoft-com:vml" xmlns:pvml="urn:schemas-microsoft-com:office:powerpoint" xmlns:com="http://schemas.openxmlformats.org/drawingml/2006/compatibility" xmlns:p14="http://schemas.microsoft.com/office/powerpoint/2010/main" xmlns:p15="http://schemas.microsoft.com/office/powerpoint/2012/main">
+<p:sldMaster xmlns:a="http://schemas.openxmlformats.org/drawingml/2006/main" xmlns:r="http://schemas.openxmlformats.org/officeDocument/2006/relationships" xmlns:p="http://schemas.openxmlformats.org/presentationml/2006/main">
   <p:cSld>
     <p:bg>
       <p:bgPr>
         <a:solidFill>
           <a:schemeClr val="lt1"/>
         </a:solidFill>
+        <a:effectLst/>
       </p:bgPr>
     </p:bg>
     <p:spTree>
       <p:nvGrpSpPr>
-        <p:cNvPr id="9" name="Shape 9"/>
+        <p:cNvPr id="1" name="Shape 9"/>
         <p:cNvGrpSpPr/>
         <p:nvPr/>
       </p:nvGrpSpPr>
@@ -2144,12 +2183,12 @@
           </a:ln>
         </p:spPr>
         <p:txBody>
-          <a:bodyPr anchorCtr="0" anchor="ctr" bIns="45700" lIns="91425" spcFirstLastPara="1" rIns="91425" wrap="square" tIns="45700">
+          <a:bodyPr spcFirstLastPara="1" wrap="square" lIns="91425" tIns="45700" rIns="91425" bIns="45700" anchor="ctr" anchorCtr="0">
             <a:noAutofit/>
           </a:bodyPr>
           <a:lstStyle/>
           <a:p>
-            <a:pPr indent="0" lvl="0" marL="0" marR="0" rtl="0" algn="ctr">
+            <a:pPr marL="0" marR="0" lvl="0" indent="0" algn="ctr" rtl="0">
               <a:spcBef>
                 <a:spcPts val="0"/>
               </a:spcBef>
@@ -2158,10 +2197,7 @@
               </a:spcAft>
               <a:buNone/>
             </a:pPr>
-            <a:r>
-              <a:t/>
-            </a:r>
-            <a:endParaRPr b="0" i="0" sz="7000" u="none" cap="none" strike="noStrike">
+            <a:endParaRPr sz="7000" b="0" i="0" u="none" strike="noStrike" cap="none">
               <a:solidFill>
                 <a:schemeClr val="lt1"/>
               </a:solidFill>
@@ -2195,12 +2231,12 @@
           </a:ln>
         </p:spPr>
         <p:txBody>
-          <a:bodyPr anchorCtr="0" anchor="ctr" bIns="45700" lIns="91425" spcFirstLastPara="1" rIns="91425" wrap="square" tIns="45700">
+          <a:bodyPr spcFirstLastPara="1" wrap="square" lIns="91425" tIns="45700" rIns="91425" bIns="45700" anchor="ctr" anchorCtr="0">
             <a:noAutofit/>
           </a:bodyPr>
           <a:lstStyle/>
           <a:p>
-            <a:pPr indent="0" lvl="0" marL="0" marR="0" rtl="0" algn="ctr">
+            <a:pPr marL="0" marR="0" lvl="0" indent="0" algn="ctr" rtl="0">
               <a:spcBef>
                 <a:spcPts val="0"/>
               </a:spcBef>
@@ -2209,10 +2245,7 @@
               </a:spcAft>
               <a:buNone/>
             </a:pPr>
-            <a:r>
-              <a:t/>
-            </a:r>
-            <a:endParaRPr b="0" i="0" sz="7000" u="none" cap="none" strike="noStrike">
+            <a:endParaRPr sz="7000" b="0" i="0" u="none" strike="noStrike" cap="none">
               <a:solidFill>
                 <a:schemeClr val="lt1"/>
               </a:solidFill>
@@ -2246,12 +2279,12 @@
           </a:ln>
         </p:spPr>
         <p:txBody>
-          <a:bodyPr anchorCtr="0" anchor="ctr" bIns="45700" lIns="91425" spcFirstLastPara="1" rIns="91425" wrap="square" tIns="45700">
+          <a:bodyPr spcFirstLastPara="1" wrap="square" lIns="91425" tIns="45700" rIns="91425" bIns="45700" anchor="ctr" anchorCtr="0">
             <a:noAutofit/>
           </a:bodyPr>
           <a:lstStyle/>
           <a:p>
-            <a:pPr indent="0" lvl="0" marL="0" marR="0" rtl="0" algn="ctr">
+            <a:pPr marL="0" marR="0" lvl="0" indent="0" algn="ctr" rtl="0">
               <a:spcBef>
                 <a:spcPts val="0"/>
               </a:spcBef>
@@ -2260,10 +2293,7 @@
               </a:spcAft>
               <a:buNone/>
             </a:pPr>
-            <a:r>
-              <a:t/>
-            </a:r>
-            <a:endParaRPr b="0" i="0" sz="7000" u="none" cap="none" strike="noStrike">
+            <a:endParaRPr sz="7000" b="0" i="0" u="none" strike="noStrike" cap="none">
               <a:solidFill>
                 <a:schemeClr val="dk1"/>
               </a:solidFill>
@@ -2295,12 +2325,12 @@
           </a:ln>
         </p:spPr>
         <p:txBody>
-          <a:bodyPr anchorCtr="0" anchor="ctr" bIns="0" lIns="0" spcFirstLastPara="1" rIns="0" wrap="square" tIns="0">
+          <a:bodyPr spcFirstLastPara="1" wrap="square" lIns="0" tIns="0" rIns="0" bIns="0" anchor="ctr" anchorCtr="0">
             <a:noAutofit/>
           </a:bodyPr>
           <a:lstStyle/>
           <a:p>
-            <a:pPr indent="0" lvl="0" marL="0" marR="0" rtl="0" algn="l">
+            <a:pPr marL="0" marR="0" lvl="0" indent="0" algn="l" rtl="0">
               <a:lnSpc>
                 <a:spcPct val="90000"/>
               </a:lnSpc>
@@ -2318,7 +2348,7 @@
               <a:buNone/>
             </a:pPr>
             <a:r>
-              <a:rPr b="0" i="0" lang="en-US" sz="5400" u="none" cap="none" strike="noStrike">
+              <a:rPr lang="en-US" sz="5400" b="0" i="0" u="none" strike="noStrike" cap="none">
                 <a:solidFill>
                   <a:schemeClr val="lt1"/>
                 </a:solidFill>
@@ -2329,7 +2359,7 @@
               </a:rPr>
               <a:t>Electrical Engineering and Computer Science</a:t>
             </a:r>
-            <a:endParaRPr b="0" i="0" sz="5400" u="none" cap="none" strike="noStrike">
+            <a:endParaRPr sz="5400" b="0" i="0" u="none" strike="noStrike" cap="none">
               <a:solidFill>
                 <a:schemeClr val="lt1"/>
               </a:solidFill>
@@ -2363,12 +2393,12 @@
           </a:ln>
         </p:spPr>
         <p:txBody>
-          <a:bodyPr anchorCtr="0" anchor="ctr" bIns="45700" lIns="91425" spcFirstLastPara="1" rIns="91425" wrap="square" tIns="45700">
+          <a:bodyPr spcFirstLastPara="1" wrap="square" lIns="91425" tIns="45700" rIns="91425" bIns="45700" anchor="ctr" anchorCtr="0">
             <a:noAutofit/>
           </a:bodyPr>
           <a:lstStyle/>
           <a:p>
-            <a:pPr indent="0" lvl="0" marL="0" marR="0" rtl="0" algn="ctr">
+            <a:pPr marL="0" marR="0" lvl="0" indent="0" algn="ctr" rtl="0">
               <a:spcBef>
                 <a:spcPts val="0"/>
               </a:spcBef>
@@ -2377,10 +2407,7 @@
               </a:spcAft>
               <a:buNone/>
             </a:pPr>
-            <a:r>
-              <a:t/>
-            </a:r>
-            <a:endParaRPr b="0" i="0" sz="7000" u="none" cap="none" strike="noStrike">
+            <a:endParaRPr sz="7000" b="0" i="0" u="none" strike="noStrike" cap="none">
               <a:solidFill>
                 <a:schemeClr val="lt1"/>
               </a:solidFill>
@@ -2394,15 +2421,15 @@
       </p:sp>
       <p:pic>
         <p:nvPicPr>
-          <p:cNvPr descr="OSU_horizontal_2C_W_over_B.eps" id="15" name="Google Shape;15;p1"/>
+          <p:cNvPr id="15" name="Google Shape;15;p1" descr="OSU_horizontal_2C_W_over_B.eps"/>
           <p:cNvPicPr preferRelativeResize="0"/>
           <p:nvPr/>
         </p:nvPicPr>
         <p:blipFill rotWithShape="1">
-          <a:blip r:embed="rId1">
+          <a:blip r:embed="rId3">
             <a:alphaModFix/>
           </a:blip>
-          <a:srcRect b="0" l="0" r="0" t="0"/>
+          <a:srcRect/>
           <a:stretch/>
         </p:blipFill>
         <p:spPr>
@@ -2434,14 +2461,14 @@
             <a:avLst/>
           </a:prstGeom>
           <a:noFill/>
-          <a:ln cap="flat" cmpd="sng" w="28575">
+          <a:ln w="28575" cap="flat" cmpd="sng">
             <a:solidFill>
               <a:schemeClr val="dk1"/>
             </a:solidFill>
             <a:prstDash val="dash"/>
             <a:miter lim="800000"/>
-            <a:headEnd len="sm" w="sm" type="none"/>
-            <a:tailEnd len="sm" w="sm" type="none"/>
+            <a:headEnd type="none" w="sm" len="sm"/>
+            <a:tailEnd type="none" w="sm" len="sm"/>
           </a:ln>
         </p:spPr>
       </p:cxnSp>
@@ -2465,12 +2492,12 @@
           </a:ln>
         </p:spPr>
         <p:txBody>
-          <a:bodyPr anchorCtr="0" anchor="ctr" bIns="0" lIns="0" spcFirstLastPara="1" rIns="0" wrap="square" tIns="0">
+          <a:bodyPr spcFirstLastPara="1" wrap="square" lIns="0" tIns="0" rIns="0" bIns="0" anchor="ctr" anchorCtr="0">
             <a:noAutofit/>
           </a:bodyPr>
           <a:lstStyle/>
           <a:p>
-            <a:pPr indent="0" lvl="0" marL="0" marR="0" rtl="0" algn="ctr">
+            <a:pPr marL="0" marR="0" lvl="0" indent="0" algn="ctr" rtl="0">
               <a:lnSpc>
                 <a:spcPct val="90000"/>
               </a:lnSpc>
@@ -2488,7 +2515,7 @@
               <a:buNone/>
             </a:pPr>
             <a:r>
-              <a:rPr b="0" i="0" lang="en-US" sz="5400" u="none" cap="none" strike="noStrike">
+              <a:rPr lang="en-US" sz="5400" b="0" i="0" u="none" strike="noStrike" cap="none">
                 <a:solidFill>
                   <a:schemeClr val="dk1"/>
                 </a:solidFill>
@@ -2499,7 +2526,7 @@
               </a:rPr>
               <a:t>FOLD</a:t>
             </a:r>
-            <a:endParaRPr b="0" i="0" sz="5400" u="none" cap="none" strike="noStrike">
+            <a:endParaRPr sz="5400" b="0" i="0" u="none" strike="noStrike" cap="none">
               <a:solidFill>
                 <a:schemeClr val="dk1"/>
               </a:solidFill>
@@ -2526,14 +2553,14 @@
             <a:avLst/>
           </a:prstGeom>
           <a:noFill/>
-          <a:ln cap="flat" cmpd="sng" w="28575">
+          <a:ln w="28575" cap="flat" cmpd="sng">
             <a:solidFill>
               <a:schemeClr val="dk1"/>
             </a:solidFill>
             <a:prstDash val="dash"/>
             <a:miter lim="800000"/>
-            <a:headEnd len="sm" w="sm" type="none"/>
-            <a:tailEnd len="sm" w="sm" type="none"/>
+            <a:headEnd type="none" w="sm" len="sm"/>
+            <a:tailEnd type="none" w="sm" len="sm"/>
           </a:ln>
         </p:spPr>
       </p:cxnSp>
@@ -2557,12 +2584,12 @@
           </a:ln>
         </p:spPr>
         <p:txBody>
-          <a:bodyPr anchorCtr="0" anchor="ctr" bIns="0" lIns="0" spcFirstLastPara="1" rIns="0" wrap="square" tIns="0">
+          <a:bodyPr spcFirstLastPara="1" wrap="square" lIns="0" tIns="0" rIns="0" bIns="0" anchor="ctr" anchorCtr="0">
             <a:noAutofit/>
           </a:bodyPr>
           <a:lstStyle/>
           <a:p>
-            <a:pPr indent="0" lvl="0" marL="0" marR="0" rtl="0" algn="ctr">
+            <a:pPr marL="0" marR="0" lvl="0" indent="0" algn="ctr" rtl="0">
               <a:lnSpc>
                 <a:spcPct val="90000"/>
               </a:lnSpc>
@@ -2580,7 +2607,7 @@
               <a:buNone/>
             </a:pPr>
             <a:r>
-              <a:rPr b="0" i="0" lang="en-US" sz="5400" u="none" cap="none" strike="noStrike">
+              <a:rPr lang="en-US" sz="5400" b="0" i="0" u="none" strike="noStrike" cap="none">
                 <a:solidFill>
                   <a:schemeClr val="dk1"/>
                 </a:solidFill>
@@ -2591,7 +2618,7 @@
               </a:rPr>
               <a:t>FOLD</a:t>
             </a:r>
-            <a:endParaRPr b="0" i="0" sz="5400" u="none" cap="none" strike="noStrike">
+            <a:endParaRPr sz="5400" b="0" i="0" u="none" strike="noStrike" cap="none">
               <a:solidFill>
                 <a:schemeClr val="dk1"/>
               </a:solidFill>
@@ -2618,14 +2645,14 @@
             <a:avLst/>
           </a:prstGeom>
           <a:noFill/>
-          <a:ln cap="flat" cmpd="sng" w="28575">
+          <a:ln w="28575" cap="flat" cmpd="sng">
             <a:solidFill>
               <a:schemeClr val="dk1"/>
             </a:solidFill>
             <a:prstDash val="dash"/>
             <a:miter lim="800000"/>
-            <a:headEnd len="sm" w="sm" type="none"/>
-            <a:tailEnd len="sm" w="sm" type="none"/>
+            <a:headEnd type="none" w="sm" len="sm"/>
+            <a:tailEnd type="none" w="sm" len="sm"/>
           </a:ln>
         </p:spPr>
       </p:cxnSp>
@@ -2649,12 +2676,12 @@
           </a:ln>
         </p:spPr>
         <p:txBody>
-          <a:bodyPr anchorCtr="0" anchor="ctr" bIns="0" lIns="0" spcFirstLastPara="1" rIns="0" wrap="square" tIns="0">
+          <a:bodyPr spcFirstLastPara="1" wrap="square" lIns="0" tIns="0" rIns="0" bIns="0" anchor="ctr" anchorCtr="0">
             <a:noAutofit/>
           </a:bodyPr>
           <a:lstStyle/>
           <a:p>
-            <a:pPr indent="0" lvl="0" marL="0" marR="0" rtl="0" algn="ctr">
+            <a:pPr marL="0" marR="0" lvl="0" indent="0" algn="ctr" rtl="0">
               <a:lnSpc>
                 <a:spcPct val="90000"/>
               </a:lnSpc>
@@ -2672,7 +2699,7 @@
               <a:buNone/>
             </a:pPr>
             <a:r>
-              <a:rPr b="0" i="0" lang="en-US" sz="5400" u="none" cap="none" strike="noStrike">
+              <a:rPr lang="en-US" sz="5400" b="0" i="0" u="none" strike="noStrike" cap="none">
                 <a:solidFill>
                   <a:schemeClr val="dk1"/>
                 </a:solidFill>
@@ -2683,7 +2710,7 @@
               </a:rPr>
               <a:t>FOLD</a:t>
             </a:r>
-            <a:endParaRPr b="0" i="0" sz="5400" u="none" cap="none" strike="noStrike">
+            <a:endParaRPr sz="5400" b="0" i="0" u="none" strike="noStrike" cap="none">
               <a:solidFill>
                 <a:schemeClr val="dk1"/>
               </a:solidFill>
@@ -2710,14 +2737,14 @@
             <a:avLst/>
           </a:prstGeom>
           <a:noFill/>
-          <a:ln cap="flat" cmpd="sng" w="28575">
+          <a:ln w="28575" cap="flat" cmpd="sng">
             <a:solidFill>
               <a:schemeClr val="dk1"/>
             </a:solidFill>
             <a:prstDash val="dash"/>
             <a:miter lim="800000"/>
-            <a:headEnd len="sm" w="sm" type="none"/>
-            <a:tailEnd len="sm" w="sm" type="none"/>
+            <a:headEnd type="none" w="sm" len="sm"/>
+            <a:tailEnd type="none" w="sm" len="sm"/>
           </a:ln>
         </p:spPr>
       </p:cxnSp>
@@ -2741,12 +2768,12 @@
           </a:ln>
         </p:spPr>
         <p:txBody>
-          <a:bodyPr anchorCtr="0" anchor="ctr" bIns="0" lIns="0" spcFirstLastPara="1" rIns="0" wrap="square" tIns="0">
+          <a:bodyPr spcFirstLastPara="1" wrap="square" lIns="0" tIns="0" rIns="0" bIns="0" anchor="ctr" anchorCtr="0">
             <a:noAutofit/>
           </a:bodyPr>
           <a:lstStyle/>
           <a:p>
-            <a:pPr indent="0" lvl="0" marL="0" marR="0" rtl="0" algn="ctr">
+            <a:pPr marL="0" marR="0" lvl="0" indent="0" algn="ctr" rtl="0">
               <a:lnSpc>
                 <a:spcPct val="90000"/>
               </a:lnSpc>
@@ -2764,7 +2791,7 @@
               <a:buNone/>
             </a:pPr>
             <a:r>
-              <a:rPr b="0" i="0" lang="en-US" sz="5400" u="none" cap="none" strike="noStrike">
+              <a:rPr lang="en-US" sz="5400" b="0" i="0" u="none" strike="noStrike" cap="none">
                 <a:solidFill>
                   <a:schemeClr val="dk1"/>
                 </a:solidFill>
@@ -2775,7 +2802,7 @@
               </a:rPr>
               <a:t>FOLD</a:t>
             </a:r>
-            <a:endParaRPr b="0" i="0" sz="5400" u="none" cap="none" strike="noStrike">
+            <a:endParaRPr sz="5400" b="0" i="0" u="none" strike="noStrike" cap="none">
               <a:solidFill>
                 <a:schemeClr val="dk1"/>
               </a:solidFill>
@@ -2802,14 +2829,14 @@
             <a:avLst/>
           </a:prstGeom>
           <a:noFill/>
-          <a:ln cap="flat" cmpd="sng" w="28575">
+          <a:ln w="28575" cap="flat" cmpd="sng">
             <a:solidFill>
               <a:schemeClr val="dk1"/>
             </a:solidFill>
             <a:prstDash val="dash"/>
             <a:miter lim="800000"/>
-            <a:headEnd len="sm" w="sm" type="none"/>
-            <a:tailEnd len="sm" w="sm" type="none"/>
+            <a:headEnd type="none" w="sm" len="sm"/>
+            <a:tailEnd type="none" w="sm" len="sm"/>
           </a:ln>
         </p:spPr>
       </p:cxnSp>
@@ -2833,12 +2860,12 @@
           </a:ln>
         </p:spPr>
         <p:txBody>
-          <a:bodyPr anchorCtr="0" anchor="ctr" bIns="0" lIns="0" spcFirstLastPara="1" rIns="0" wrap="square" tIns="0">
+          <a:bodyPr spcFirstLastPara="1" wrap="square" lIns="0" tIns="0" rIns="0" bIns="0" anchor="ctr" anchorCtr="0">
             <a:noAutofit/>
           </a:bodyPr>
           <a:lstStyle/>
           <a:p>
-            <a:pPr indent="0" lvl="0" marL="0" marR="0" rtl="0" algn="ctr">
+            <a:pPr marL="0" marR="0" lvl="0" indent="0" algn="ctr" rtl="0">
               <a:lnSpc>
                 <a:spcPct val="120000"/>
               </a:lnSpc>
@@ -2856,7 +2883,7 @@
               <a:buNone/>
             </a:pPr>
             <a:r>
-              <a:rPr b="0" i="0" lang="en-US" sz="5400" u="none" cap="none" strike="noStrike">
+              <a:rPr lang="en-US" sz="5400" b="0" i="0" u="none" strike="noStrike" cap="none">
                 <a:solidFill>
                   <a:schemeClr val="dk1"/>
                 </a:solidFill>
@@ -2870,7 +2897,7 @@
             <a:endParaRPr/>
           </a:p>
           <a:p>
-            <a:pPr indent="0" lvl="0" marL="0" marR="0" rtl="0" algn="ctr">
+            <a:pPr marL="0" marR="0" lvl="0" indent="0" algn="ctr" rtl="0">
               <a:lnSpc>
                 <a:spcPct val="120000"/>
               </a:lnSpc>
@@ -2888,7 +2915,7 @@
               <a:buNone/>
             </a:pPr>
             <a:r>
-              <a:rPr b="0" i="0" lang="en-US" sz="5400" u="none" cap="none" strike="noStrike">
+              <a:rPr lang="en-US" sz="5400" b="0" i="0" u="none" strike="noStrike" cap="none">
                 <a:solidFill>
                   <a:schemeClr val="dk1"/>
                 </a:solidFill>
@@ -2899,7 +2926,7 @@
               </a:rPr>
               <a:t>IN ORANGE BOX BELOW THIS LINE</a:t>
             </a:r>
-            <a:endParaRPr b="0" i="0" sz="5400" u="none" cap="none" strike="noStrike">
+            <a:endParaRPr sz="5400" b="0" i="0" u="none" strike="noStrike" cap="none">
               <a:solidFill>
                 <a:schemeClr val="dk1"/>
               </a:solidFill>
@@ -2933,12 +2960,12 @@
           </a:ln>
         </p:spPr>
         <p:txBody>
-          <a:bodyPr anchorCtr="0" anchor="ctr" bIns="45700" lIns="91425" spcFirstLastPara="1" rIns="91425" wrap="square" tIns="45700">
+          <a:bodyPr spcFirstLastPara="1" wrap="square" lIns="91425" tIns="45700" rIns="91425" bIns="45700" anchor="ctr" anchorCtr="0">
             <a:noAutofit/>
           </a:bodyPr>
           <a:lstStyle/>
           <a:p>
-            <a:pPr indent="0" lvl="0" marL="0" marR="0" rtl="0" algn="ctr">
+            <a:pPr marL="0" marR="0" lvl="0" indent="0" algn="ctr" rtl="0">
               <a:spcBef>
                 <a:spcPts val="0"/>
               </a:spcBef>
@@ -2947,10 +2974,7 @@
               </a:spcAft>
               <a:buNone/>
             </a:pPr>
-            <a:r>
-              <a:t/>
-            </a:r>
-            <a:endParaRPr b="0" i="0" sz="7000" u="none" cap="none" strike="noStrike">
+            <a:endParaRPr sz="7000" b="0" i="0" u="none" strike="noStrike" cap="none">
               <a:solidFill>
                 <a:schemeClr val="dk1"/>
               </a:solidFill>
@@ -2982,12 +3006,12 @@
           </a:ln>
         </p:spPr>
         <p:txBody>
-          <a:bodyPr anchorCtr="0" anchor="ctr" bIns="0" lIns="0" spcFirstLastPara="1" rIns="0" wrap="square" tIns="0">
+          <a:bodyPr spcFirstLastPara="1" wrap="square" lIns="0" tIns="0" rIns="0" bIns="0" anchor="ctr" anchorCtr="0">
             <a:noAutofit/>
           </a:bodyPr>
           <a:lstStyle/>
           <a:p>
-            <a:pPr indent="0" lvl="0" marL="0" marR="0" rtl="0" algn="l">
+            <a:pPr marL="0" marR="0" lvl="0" indent="0" algn="l" rtl="0">
               <a:lnSpc>
                 <a:spcPct val="90000"/>
               </a:lnSpc>
@@ -3005,7 +3029,7 @@
               <a:buNone/>
             </a:pPr>
             <a:r>
-              <a:rPr b="0" i="0" lang="en-US" sz="5400" u="none" cap="none" strike="noStrike">
+              <a:rPr lang="en-US" sz="5400" b="0" i="0" u="none" strike="noStrike" cap="none">
                 <a:solidFill>
                   <a:schemeClr val="lt1"/>
                 </a:solidFill>
@@ -3016,7 +3040,7 @@
               </a:rPr>
               <a:t>COLLEGE OF ENGINEERING</a:t>
             </a:r>
-            <a:endParaRPr b="0" i="0" sz="5400" u="none" cap="none" strike="noStrike">
+            <a:endParaRPr sz="5400" b="0" i="0" u="none" strike="noStrike" cap="none">
               <a:solidFill>
                 <a:schemeClr val="lt1"/>
               </a:solidFill>
@@ -3030,14 +3054,14 @@
       </p:sp>
     </p:spTree>
   </p:cSld>
-  <p:clrMap accent1="accent1" accent2="accent2" accent3="accent3" accent4="accent4" accent5="accent5" accent6="accent6" bg1="lt1" bg2="dk2" tx1="dk1" tx2="lt2" folHlink="folHlink" hlink="hlink"/>
+  <p:clrMap bg1="lt1" tx1="dk1" bg2="dk2" tx2="lt2" accent1="accent1" accent2="accent2" accent3="accent3" accent4="accent4" accent5="accent5" accent6="accent6" hlink="hlink" folHlink="folHlink"/>
   <p:sldLayoutIdLst>
-    <p:sldLayoutId id="2147483648" r:id="rId2"/>
+    <p:sldLayoutId id="2147483648" r:id="rId1"/>
   </p:sldLayoutIdLst>
-  <p:hf dt="0" ftr="0" hdr="0" sldNum="0"/>
+  <p:hf sldNum="0" hdr="0" ftr="0" dt="0"/>
   <p:txStyles>
     <p:titleStyle>
-      <a:defPPr lvl="0" marR="0" rtl="0" algn="l">
+      <a:defPPr marR="0" lvl="0" algn="l" rtl="0">
         <a:lnSpc>
           <a:spcPct val="100000"/>
         </a:lnSpc>
@@ -3048,7 +3072,7 @@
           <a:spcPts val="0"/>
         </a:spcAft>
       </a:defPPr>
-      <a:lvl1pPr lvl="0" marR="0" rtl="0" algn="l">
+      <a:lvl1pPr marR="0" lvl="0" algn="l" rtl="0">
         <a:lnSpc>
           <a:spcPct val="100000"/>
         </a:lnSpc>
@@ -3062,7 +3086,7 @@
           <a:srgbClr val="000000"/>
         </a:buClr>
         <a:buFont typeface="Arial"/>
-        <a:defRPr b="0" i="0" sz="1400" u="none" cap="none" strike="noStrike">
+        <a:defRPr sz="1400" b="0" i="0" u="none" strike="noStrike" cap="none">
           <a:solidFill>
             <a:srgbClr val="000000"/>
           </a:solidFill>
@@ -3072,7 +3096,7 @@
           <a:sym typeface="Arial"/>
         </a:defRPr>
       </a:lvl1pPr>
-      <a:lvl2pPr lvl="1" marR="0" rtl="0" algn="l">
+      <a:lvl2pPr marR="0" lvl="1" algn="l" rtl="0">
         <a:lnSpc>
           <a:spcPct val="100000"/>
         </a:lnSpc>
@@ -3086,7 +3110,7 @@
           <a:srgbClr val="000000"/>
         </a:buClr>
         <a:buFont typeface="Arial"/>
-        <a:defRPr b="0" i="0" sz="1400" u="none" cap="none" strike="noStrike">
+        <a:defRPr sz="1400" b="0" i="0" u="none" strike="noStrike" cap="none">
           <a:solidFill>
             <a:srgbClr val="000000"/>
           </a:solidFill>
@@ -3096,7 +3120,7 @@
           <a:sym typeface="Arial"/>
         </a:defRPr>
       </a:lvl2pPr>
-      <a:lvl3pPr lvl="2" marR="0" rtl="0" algn="l">
+      <a:lvl3pPr marR="0" lvl="2" algn="l" rtl="0">
         <a:lnSpc>
           <a:spcPct val="100000"/>
         </a:lnSpc>
@@ -3110,7 +3134,7 @@
           <a:srgbClr val="000000"/>
         </a:buClr>
         <a:buFont typeface="Arial"/>
-        <a:defRPr b="0" i="0" sz="1400" u="none" cap="none" strike="noStrike">
+        <a:defRPr sz="1400" b="0" i="0" u="none" strike="noStrike" cap="none">
           <a:solidFill>
             <a:srgbClr val="000000"/>
           </a:solidFill>
@@ -3120,7 +3144,7 @@
           <a:sym typeface="Arial"/>
         </a:defRPr>
       </a:lvl3pPr>
-      <a:lvl4pPr lvl="3" marR="0" rtl="0" algn="l">
+      <a:lvl4pPr marR="0" lvl="3" algn="l" rtl="0">
         <a:lnSpc>
           <a:spcPct val="100000"/>
         </a:lnSpc>
@@ -3134,7 +3158,7 @@
           <a:srgbClr val="000000"/>
         </a:buClr>
         <a:buFont typeface="Arial"/>
-        <a:defRPr b="0" i="0" sz="1400" u="none" cap="none" strike="noStrike">
+        <a:defRPr sz="1400" b="0" i="0" u="none" strike="noStrike" cap="none">
           <a:solidFill>
             <a:srgbClr val="000000"/>
           </a:solidFill>
@@ -3144,7 +3168,7 @@
           <a:sym typeface="Arial"/>
         </a:defRPr>
       </a:lvl4pPr>
-      <a:lvl5pPr lvl="4" marR="0" rtl="0" algn="l">
+      <a:lvl5pPr marR="0" lvl="4" algn="l" rtl="0">
         <a:lnSpc>
           <a:spcPct val="100000"/>
         </a:lnSpc>
@@ -3158,7 +3182,7 @@
           <a:srgbClr val="000000"/>
         </a:buClr>
         <a:buFont typeface="Arial"/>
-        <a:defRPr b="0" i="0" sz="1400" u="none" cap="none" strike="noStrike">
+        <a:defRPr sz="1400" b="0" i="0" u="none" strike="noStrike" cap="none">
           <a:solidFill>
             <a:srgbClr val="000000"/>
           </a:solidFill>
@@ -3168,7 +3192,7 @@
           <a:sym typeface="Arial"/>
         </a:defRPr>
       </a:lvl5pPr>
-      <a:lvl6pPr lvl="5" marR="0" rtl="0" algn="l">
+      <a:lvl6pPr marR="0" lvl="5" algn="l" rtl="0">
         <a:lnSpc>
           <a:spcPct val="100000"/>
         </a:lnSpc>
@@ -3182,7 +3206,7 @@
           <a:srgbClr val="000000"/>
         </a:buClr>
         <a:buFont typeface="Arial"/>
-        <a:defRPr b="0" i="0" sz="1400" u="none" cap="none" strike="noStrike">
+        <a:defRPr sz="1400" b="0" i="0" u="none" strike="noStrike" cap="none">
           <a:solidFill>
             <a:srgbClr val="000000"/>
           </a:solidFill>
@@ -3192,7 +3216,7 @@
           <a:sym typeface="Arial"/>
         </a:defRPr>
       </a:lvl6pPr>
-      <a:lvl7pPr lvl="6" marR="0" rtl="0" algn="l">
+      <a:lvl7pPr marR="0" lvl="6" algn="l" rtl="0">
         <a:lnSpc>
           <a:spcPct val="100000"/>
         </a:lnSpc>
@@ -3206,7 +3230,7 @@
           <a:srgbClr val="000000"/>
         </a:buClr>
         <a:buFont typeface="Arial"/>
-        <a:defRPr b="0" i="0" sz="1400" u="none" cap="none" strike="noStrike">
+        <a:defRPr sz="1400" b="0" i="0" u="none" strike="noStrike" cap="none">
           <a:solidFill>
             <a:srgbClr val="000000"/>
           </a:solidFill>
@@ -3216,7 +3240,7 @@
           <a:sym typeface="Arial"/>
         </a:defRPr>
       </a:lvl7pPr>
-      <a:lvl8pPr lvl="7" marR="0" rtl="0" algn="l">
+      <a:lvl8pPr marR="0" lvl="7" algn="l" rtl="0">
         <a:lnSpc>
           <a:spcPct val="100000"/>
         </a:lnSpc>
@@ -3230,7 +3254,7 @@
           <a:srgbClr val="000000"/>
         </a:buClr>
         <a:buFont typeface="Arial"/>
-        <a:defRPr b="0" i="0" sz="1400" u="none" cap="none" strike="noStrike">
+        <a:defRPr sz="1400" b="0" i="0" u="none" strike="noStrike" cap="none">
           <a:solidFill>
             <a:srgbClr val="000000"/>
           </a:solidFill>
@@ -3240,7 +3264,7 @@
           <a:sym typeface="Arial"/>
         </a:defRPr>
       </a:lvl8pPr>
-      <a:lvl9pPr lvl="8" marR="0" rtl="0" algn="l">
+      <a:lvl9pPr marR="0" lvl="8" algn="l" rtl="0">
         <a:lnSpc>
           <a:spcPct val="100000"/>
         </a:lnSpc>
@@ -3254,7 +3278,7 @@
           <a:srgbClr val="000000"/>
         </a:buClr>
         <a:buFont typeface="Arial"/>
-        <a:defRPr b="0" i="0" sz="1400" u="none" cap="none" strike="noStrike">
+        <a:defRPr sz="1400" b="0" i="0" u="none" strike="noStrike" cap="none">
           <a:solidFill>
             <a:srgbClr val="000000"/>
           </a:solidFill>
@@ -3266,7 +3290,7 @@
       </a:lvl9pPr>
     </p:titleStyle>
     <p:bodyStyle>
-      <a:defPPr lvl="0" marR="0" rtl="0" algn="l">
+      <a:defPPr marR="0" lvl="0" algn="l" rtl="0">
         <a:lnSpc>
           <a:spcPct val="100000"/>
         </a:lnSpc>
@@ -3277,7 +3301,7 @@
           <a:spcPts val="0"/>
         </a:spcAft>
       </a:defPPr>
-      <a:lvl1pPr lvl="0" marR="0" rtl="0" algn="l">
+      <a:lvl1pPr marR="0" lvl="0" algn="l" rtl="0">
         <a:lnSpc>
           <a:spcPct val="100000"/>
         </a:lnSpc>
@@ -3291,7 +3315,7 @@
           <a:srgbClr val="000000"/>
         </a:buClr>
         <a:buFont typeface="Arial"/>
-        <a:defRPr b="0" i="0" sz="1400" u="none" cap="none" strike="noStrike">
+        <a:defRPr sz="1400" b="0" i="0" u="none" strike="noStrike" cap="none">
           <a:solidFill>
             <a:srgbClr val="000000"/>
           </a:solidFill>
@@ -3301,7 +3325,7 @@
           <a:sym typeface="Arial"/>
         </a:defRPr>
       </a:lvl1pPr>
-      <a:lvl2pPr lvl="1" marR="0" rtl="0" algn="l">
+      <a:lvl2pPr marR="0" lvl="1" algn="l" rtl="0">
         <a:lnSpc>
           <a:spcPct val="100000"/>
         </a:lnSpc>
@@ -3315,7 +3339,7 @@
           <a:srgbClr val="000000"/>
         </a:buClr>
         <a:buFont typeface="Arial"/>
-        <a:defRPr b="0" i="0" sz="1400" u="none" cap="none" strike="noStrike">
+        <a:defRPr sz="1400" b="0" i="0" u="none" strike="noStrike" cap="none">
           <a:solidFill>
             <a:srgbClr val="000000"/>
           </a:solidFill>
@@ -3325,7 +3349,7 @@
           <a:sym typeface="Arial"/>
         </a:defRPr>
       </a:lvl2pPr>
-      <a:lvl3pPr lvl="2" marR="0" rtl="0" algn="l">
+      <a:lvl3pPr marR="0" lvl="2" algn="l" rtl="0">
         <a:lnSpc>
           <a:spcPct val="100000"/>
         </a:lnSpc>
@@ -3339,7 +3363,7 @@
           <a:srgbClr val="000000"/>
         </a:buClr>
         <a:buFont typeface="Arial"/>
-        <a:defRPr b="0" i="0" sz="1400" u="none" cap="none" strike="noStrike">
+        <a:defRPr sz="1400" b="0" i="0" u="none" strike="noStrike" cap="none">
           <a:solidFill>
             <a:srgbClr val="000000"/>
           </a:solidFill>
@@ -3349,7 +3373,7 @@
           <a:sym typeface="Arial"/>
         </a:defRPr>
       </a:lvl3pPr>
-      <a:lvl4pPr lvl="3" marR="0" rtl="0" algn="l">
+      <a:lvl4pPr marR="0" lvl="3" algn="l" rtl="0">
         <a:lnSpc>
           <a:spcPct val="100000"/>
         </a:lnSpc>
@@ -3363,7 +3387,7 @@
           <a:srgbClr val="000000"/>
         </a:buClr>
         <a:buFont typeface="Arial"/>
-        <a:defRPr b="0" i="0" sz="1400" u="none" cap="none" strike="noStrike">
+        <a:defRPr sz="1400" b="0" i="0" u="none" strike="noStrike" cap="none">
           <a:solidFill>
             <a:srgbClr val="000000"/>
           </a:solidFill>
@@ -3373,7 +3397,7 @@
           <a:sym typeface="Arial"/>
         </a:defRPr>
       </a:lvl4pPr>
-      <a:lvl5pPr lvl="4" marR="0" rtl="0" algn="l">
+      <a:lvl5pPr marR="0" lvl="4" algn="l" rtl="0">
         <a:lnSpc>
           <a:spcPct val="100000"/>
         </a:lnSpc>
@@ -3387,7 +3411,7 @@
           <a:srgbClr val="000000"/>
         </a:buClr>
         <a:buFont typeface="Arial"/>
-        <a:defRPr b="0" i="0" sz="1400" u="none" cap="none" strike="noStrike">
+        <a:defRPr sz="1400" b="0" i="0" u="none" strike="noStrike" cap="none">
           <a:solidFill>
             <a:srgbClr val="000000"/>
           </a:solidFill>
@@ -3397,7 +3421,7 @@
           <a:sym typeface="Arial"/>
         </a:defRPr>
       </a:lvl5pPr>
-      <a:lvl6pPr lvl="5" marR="0" rtl="0" algn="l">
+      <a:lvl6pPr marR="0" lvl="5" algn="l" rtl="0">
         <a:lnSpc>
           <a:spcPct val="100000"/>
         </a:lnSpc>
@@ -3411,7 +3435,7 @@
           <a:srgbClr val="000000"/>
         </a:buClr>
         <a:buFont typeface="Arial"/>
-        <a:defRPr b="0" i="0" sz="1400" u="none" cap="none" strike="noStrike">
+        <a:defRPr sz="1400" b="0" i="0" u="none" strike="noStrike" cap="none">
           <a:solidFill>
             <a:srgbClr val="000000"/>
           </a:solidFill>
@@ -3421,7 +3445,7 @@
           <a:sym typeface="Arial"/>
         </a:defRPr>
       </a:lvl6pPr>
-      <a:lvl7pPr lvl="6" marR="0" rtl="0" algn="l">
+      <a:lvl7pPr marR="0" lvl="6" algn="l" rtl="0">
         <a:lnSpc>
           <a:spcPct val="100000"/>
         </a:lnSpc>
@@ -3435,7 +3459,7 @@
           <a:srgbClr val="000000"/>
         </a:buClr>
         <a:buFont typeface="Arial"/>
-        <a:defRPr b="0" i="0" sz="1400" u="none" cap="none" strike="noStrike">
+        <a:defRPr sz="1400" b="0" i="0" u="none" strike="noStrike" cap="none">
           <a:solidFill>
             <a:srgbClr val="000000"/>
           </a:solidFill>
@@ -3445,7 +3469,7 @@
           <a:sym typeface="Arial"/>
         </a:defRPr>
       </a:lvl7pPr>
-      <a:lvl8pPr lvl="7" marR="0" rtl="0" algn="l">
+      <a:lvl8pPr marR="0" lvl="7" algn="l" rtl="0">
         <a:lnSpc>
           <a:spcPct val="100000"/>
         </a:lnSpc>
@@ -3459,7 +3483,7 @@
           <a:srgbClr val="000000"/>
         </a:buClr>
         <a:buFont typeface="Arial"/>
-        <a:defRPr b="0" i="0" sz="1400" u="none" cap="none" strike="noStrike">
+        <a:defRPr sz="1400" b="0" i="0" u="none" strike="noStrike" cap="none">
           <a:solidFill>
             <a:srgbClr val="000000"/>
           </a:solidFill>
@@ -3469,7 +3493,7 @@
           <a:sym typeface="Arial"/>
         </a:defRPr>
       </a:lvl8pPr>
-      <a:lvl9pPr lvl="8" marR="0" rtl="0" algn="l">
+      <a:lvl9pPr marR="0" lvl="8" algn="l" rtl="0">
         <a:lnSpc>
           <a:spcPct val="100000"/>
         </a:lnSpc>
@@ -3483,7 +3507,7 @@
           <a:srgbClr val="000000"/>
         </a:buClr>
         <a:buFont typeface="Arial"/>
-        <a:defRPr b="0" i="0" sz="1400" u="none" cap="none" strike="noStrike">
+        <a:defRPr sz="1400" b="0" i="0" u="none" strike="noStrike" cap="none">
           <a:solidFill>
             <a:srgbClr val="000000"/>
           </a:solidFill>
@@ -3495,7 +3519,7 @@
       </a:lvl9pPr>
     </p:bodyStyle>
     <p:otherStyle>
-      <a:defPPr lvl="0" marR="0" rtl="0" algn="l">
+      <a:defPPr marR="0" lvl="0" algn="l" rtl="0">
         <a:lnSpc>
           <a:spcPct val="100000"/>
         </a:lnSpc>
@@ -3506,7 +3530,7 @@
           <a:spcPts val="0"/>
         </a:spcAft>
       </a:defPPr>
-      <a:lvl1pPr lvl="0" marR="0" rtl="0" algn="l">
+      <a:lvl1pPr marR="0" lvl="0" algn="l" rtl="0">
         <a:lnSpc>
           <a:spcPct val="100000"/>
         </a:lnSpc>
@@ -3520,7 +3544,7 @@
           <a:srgbClr val="000000"/>
         </a:buClr>
         <a:buFont typeface="Arial"/>
-        <a:defRPr b="0" i="0" sz="1400" u="none" cap="none" strike="noStrike">
+        <a:defRPr sz="1400" b="0" i="0" u="none" strike="noStrike" cap="none">
           <a:solidFill>
             <a:srgbClr val="000000"/>
           </a:solidFill>
@@ -3530,7 +3554,7 @@
           <a:sym typeface="Arial"/>
         </a:defRPr>
       </a:lvl1pPr>
-      <a:lvl2pPr lvl="1" marR="0" rtl="0" algn="l">
+      <a:lvl2pPr marR="0" lvl="1" algn="l" rtl="0">
         <a:lnSpc>
           <a:spcPct val="100000"/>
         </a:lnSpc>
@@ -3544,7 +3568,7 @@
           <a:srgbClr val="000000"/>
         </a:buClr>
         <a:buFont typeface="Arial"/>
-        <a:defRPr b="0" i="0" sz="1400" u="none" cap="none" strike="noStrike">
+        <a:defRPr sz="1400" b="0" i="0" u="none" strike="noStrike" cap="none">
           <a:solidFill>
             <a:srgbClr val="000000"/>
           </a:solidFill>
@@ -3554,7 +3578,7 @@
           <a:sym typeface="Arial"/>
         </a:defRPr>
       </a:lvl2pPr>
-      <a:lvl3pPr lvl="2" marR="0" rtl="0" algn="l">
+      <a:lvl3pPr marR="0" lvl="2" algn="l" rtl="0">
         <a:lnSpc>
           <a:spcPct val="100000"/>
         </a:lnSpc>
@@ -3568,7 +3592,7 @@
           <a:srgbClr val="000000"/>
         </a:buClr>
         <a:buFont typeface="Arial"/>
-        <a:defRPr b="0" i="0" sz="1400" u="none" cap="none" strike="noStrike">
+        <a:defRPr sz="1400" b="0" i="0" u="none" strike="noStrike" cap="none">
           <a:solidFill>
             <a:srgbClr val="000000"/>
           </a:solidFill>
@@ -3578,7 +3602,7 @@
           <a:sym typeface="Arial"/>
         </a:defRPr>
       </a:lvl3pPr>
-      <a:lvl4pPr lvl="3" marR="0" rtl="0" algn="l">
+      <a:lvl4pPr marR="0" lvl="3" algn="l" rtl="0">
         <a:lnSpc>
           <a:spcPct val="100000"/>
         </a:lnSpc>
@@ -3592,7 +3616,7 @@
           <a:srgbClr val="000000"/>
         </a:buClr>
         <a:buFont typeface="Arial"/>
-        <a:defRPr b="0" i="0" sz="1400" u="none" cap="none" strike="noStrike">
+        <a:defRPr sz="1400" b="0" i="0" u="none" strike="noStrike" cap="none">
           <a:solidFill>
             <a:srgbClr val="000000"/>
           </a:solidFill>
@@ -3602,7 +3626,7 @@
           <a:sym typeface="Arial"/>
         </a:defRPr>
       </a:lvl4pPr>
-      <a:lvl5pPr lvl="4" marR="0" rtl="0" algn="l">
+      <a:lvl5pPr marR="0" lvl="4" algn="l" rtl="0">
         <a:lnSpc>
           <a:spcPct val="100000"/>
         </a:lnSpc>
@@ -3616,7 +3640,7 @@
           <a:srgbClr val="000000"/>
         </a:buClr>
         <a:buFont typeface="Arial"/>
-        <a:defRPr b="0" i="0" sz="1400" u="none" cap="none" strike="noStrike">
+        <a:defRPr sz="1400" b="0" i="0" u="none" strike="noStrike" cap="none">
           <a:solidFill>
             <a:srgbClr val="000000"/>
           </a:solidFill>
@@ -3626,7 +3650,7 @@
           <a:sym typeface="Arial"/>
         </a:defRPr>
       </a:lvl5pPr>
-      <a:lvl6pPr lvl="5" marR="0" rtl="0" algn="l">
+      <a:lvl6pPr marR="0" lvl="5" algn="l" rtl="0">
         <a:lnSpc>
           <a:spcPct val="100000"/>
         </a:lnSpc>
@@ -3640,7 +3664,7 @@
           <a:srgbClr val="000000"/>
         </a:buClr>
         <a:buFont typeface="Arial"/>
-        <a:defRPr b="0" i="0" sz="1400" u="none" cap="none" strike="noStrike">
+        <a:defRPr sz="1400" b="0" i="0" u="none" strike="noStrike" cap="none">
           <a:solidFill>
             <a:srgbClr val="000000"/>
           </a:solidFill>
@@ -3650,7 +3674,7 @@
           <a:sym typeface="Arial"/>
         </a:defRPr>
       </a:lvl6pPr>
-      <a:lvl7pPr lvl="6" marR="0" rtl="0" algn="l">
+      <a:lvl7pPr marR="0" lvl="6" algn="l" rtl="0">
         <a:lnSpc>
           <a:spcPct val="100000"/>
         </a:lnSpc>
@@ -3664,7 +3688,7 @@
           <a:srgbClr val="000000"/>
         </a:buClr>
         <a:buFont typeface="Arial"/>
-        <a:defRPr b="0" i="0" sz="1400" u="none" cap="none" strike="noStrike">
+        <a:defRPr sz="1400" b="0" i="0" u="none" strike="noStrike" cap="none">
           <a:solidFill>
             <a:srgbClr val="000000"/>
           </a:solidFill>
@@ -3674,7 +3698,7 @@
           <a:sym typeface="Arial"/>
         </a:defRPr>
       </a:lvl7pPr>
-      <a:lvl8pPr lvl="7" marR="0" rtl="0" algn="l">
+      <a:lvl8pPr marR="0" lvl="7" algn="l" rtl="0">
         <a:lnSpc>
           <a:spcPct val="100000"/>
         </a:lnSpc>
@@ -3688,7 +3712,7 @@
           <a:srgbClr val="000000"/>
         </a:buClr>
         <a:buFont typeface="Arial"/>
-        <a:defRPr b="0" i="0" sz="1400" u="none" cap="none" strike="noStrike">
+        <a:defRPr sz="1400" b="0" i="0" u="none" strike="noStrike" cap="none">
           <a:solidFill>
             <a:srgbClr val="000000"/>
           </a:solidFill>
@@ -3698,7 +3722,7 @@
           <a:sym typeface="Arial"/>
         </a:defRPr>
       </a:lvl8pPr>
-      <a:lvl9pPr lvl="8" marR="0" rtl="0" algn="l">
+      <a:lvl9pPr marR="0" lvl="8" algn="l" rtl="0">
         <a:lnSpc>
           <a:spcPct val="100000"/>
         </a:lnSpc>
@@ -3712,7 +3736,7 @@
           <a:srgbClr val="000000"/>
         </a:buClr>
         <a:buFont typeface="Arial"/>
-        <a:defRPr b="0" i="0" sz="1400" u="none" cap="none" strike="noStrike">
+        <a:defRPr sz="1400" b="0" i="0" u="none" strike="noStrike" cap="none">
           <a:solidFill>
             <a:srgbClr val="000000"/>
           </a:solidFill>
@@ -3728,11 +3752,11 @@
 </file>
 
 <file path=ppt/slides/slide1.xml><?xml version="1.0" encoding="utf-8"?>
-<p:sld xmlns:a="http://schemas.openxmlformats.org/drawingml/2006/main" xmlns:r="http://schemas.openxmlformats.org/officeDocument/2006/relationships" xmlns:mc="http://schemas.openxmlformats.org/markup-compatibility/2006" xmlns:mv="urn:schemas-microsoft-com:mac:vml" xmlns:p="http://schemas.openxmlformats.org/presentationml/2006/main" xmlns:c="http://schemas.openxmlformats.org/drawingml/2006/chart" xmlns:dgm="http://schemas.openxmlformats.org/drawingml/2006/diagram" xmlns:o="urn:schemas-microsoft-com:office:office" xmlns:v="urn:schemas-microsoft-com:vml" xmlns:pvml="urn:schemas-microsoft-com:office:powerpoint" xmlns:com="http://schemas.openxmlformats.org/drawingml/2006/compatibility" xmlns:p14="http://schemas.microsoft.com/office/powerpoint/2010/main" xmlns:p15="http://schemas.microsoft.com/office/powerpoint/2012/main">
+<p:sld xmlns:a="http://schemas.openxmlformats.org/drawingml/2006/main" xmlns:r="http://schemas.openxmlformats.org/officeDocument/2006/relationships" xmlns:p="http://schemas.openxmlformats.org/presentationml/2006/main">
   <p:cSld>
     <p:spTree>
       <p:nvGrpSpPr>
-        <p:cNvPr id="34" name="Shape 34"/>
+        <p:cNvPr id="1" name="Shape 34"/>
         <p:cNvGrpSpPr/>
         <p:nvPr/>
       </p:nvGrpSpPr>
@@ -3764,37 +3788,29 @@
           </a:ln>
         </p:spPr>
         <p:txBody>
-          <a:bodyPr anchorCtr="0" anchor="t" bIns="0" lIns="0" spcFirstLastPara="1" rIns="0" wrap="square" tIns="0">
+          <a:bodyPr spcFirstLastPara="1" wrap="square" lIns="0" tIns="0" rIns="0" bIns="0" anchor="t" anchorCtr="0">
             <a:noAutofit/>
           </a:bodyPr>
           <a:lstStyle/>
           <a:p>
-            <a:pPr indent="0" lvl="0" marL="0" marR="0" rtl="0" algn="l">
+            <a:pPr lvl="0">
               <a:lnSpc>
                 <a:spcPct val="90000"/>
               </a:lnSpc>
-              <a:spcBef>
-                <a:spcPts val="0"/>
-              </a:spcBef>
-              <a:spcAft>
-                <a:spcPts val="0"/>
-              </a:spcAft>
               <a:buClr>
                 <a:srgbClr val="E05529"/>
               </a:buClr>
               <a:buSzPts val="4800"/>
-              <a:buFont typeface="Arial"/>
-              <a:buNone/>
             </a:pPr>
             <a:r>
-              <a:rPr lang="en-US" sz="4800">
+              <a:rPr lang="en-US" sz="4800" dirty="0">
                 <a:solidFill>
                   <a:srgbClr val="E05529"/>
                 </a:solidFill>
               </a:rPr>
-              <a:t>FRONT END</a:t>
+              <a:t>STYLING &amp; DESIGN</a:t>
             </a:r>
-            <a:endParaRPr b="0" i="0" sz="4800" u="none" cap="none" strike="noStrike">
+            <a:endParaRPr sz="4800" b="0" i="0" u="none" strike="noStrike" cap="none" dirty="0">
               <a:solidFill>
                 <a:srgbClr val="E05529"/>
               </a:solidFill>
@@ -3826,12 +3842,12 @@
           </a:ln>
         </p:spPr>
         <p:txBody>
-          <a:bodyPr anchorCtr="0" anchor="t" bIns="0" lIns="0" spcFirstLastPara="1" rIns="0" wrap="square" tIns="0">
+          <a:bodyPr spcFirstLastPara="1" wrap="square" lIns="0" tIns="0" rIns="0" bIns="0" anchor="t" anchorCtr="0">
             <a:noAutofit/>
           </a:bodyPr>
           <a:lstStyle/>
           <a:p>
-            <a:pPr indent="-406400" lvl="0" marL="457200" marR="0" rtl="0" algn="l">
+            <a:pPr marL="457200" marR="0" lvl="0" indent="-406400" algn="l" rtl="0">
               <a:lnSpc>
                 <a:spcPct val="120000"/>
               </a:lnSpc>
@@ -3848,21 +3864,21 @@
               <a:buChar char="●"/>
             </a:pPr>
             <a:r>
-              <a:rPr lang="en-US" sz="2800">
+              <a:rPr lang="en-US" sz="2800" dirty="0">
                 <a:solidFill>
                   <a:schemeClr val="dk1"/>
                 </a:solidFill>
               </a:rPr>
               <a:t>The front end of this application is built using ReactJS components. These components include things like header bars and side menus that combine to form the entire page. This made the page modular and easy to experiment with.</a:t>
             </a:r>
-            <a:endParaRPr sz="2800">
+            <a:endParaRPr sz="2800" dirty="0">
               <a:solidFill>
                 <a:schemeClr val="dk1"/>
               </a:solidFill>
             </a:endParaRPr>
           </a:p>
           <a:p>
-            <a:pPr indent="-406400" lvl="0" marL="457200" marR="0" rtl="0" algn="l">
+            <a:pPr marL="457200" marR="0" lvl="0" indent="-406400" algn="l" rtl="0">
               <a:lnSpc>
                 <a:spcPct val="120000"/>
               </a:lnSpc>
@@ -3879,21 +3895,21 @@
               <a:buChar char="●"/>
             </a:pPr>
             <a:r>
-              <a:rPr lang="en-US" sz="2800">
+              <a:rPr lang="en-US" sz="2800" dirty="0">
                 <a:solidFill>
                   <a:schemeClr val="dk1"/>
                 </a:solidFill>
               </a:rPr>
               <a:t>The styling of the page is done using Sass, which is compiled into CSS code.</a:t>
             </a:r>
-            <a:endParaRPr sz="2800">
+            <a:endParaRPr sz="2800" dirty="0">
               <a:solidFill>
                 <a:schemeClr val="dk1"/>
               </a:solidFill>
             </a:endParaRPr>
           </a:p>
           <a:p>
-            <a:pPr indent="-406400" lvl="0" marL="457200" marR="0" rtl="0" algn="l">
+            <a:pPr marL="457200" marR="0" lvl="0" indent="-406400" algn="l" rtl="0">
               <a:lnSpc>
                 <a:spcPct val="120000"/>
               </a:lnSpc>
@@ -3910,21 +3926,21 @@
               <a:buChar char="●"/>
             </a:pPr>
             <a:r>
-              <a:rPr lang="en-US" sz="2800">
+              <a:rPr lang="en-US" sz="2800" dirty="0">
                 <a:solidFill>
                   <a:schemeClr val="dk1"/>
                 </a:solidFill>
               </a:rPr>
               <a:t>Usability is one of the main goals of this application, and it uses dynamic page loading, graphics, and a mobile optimized view to ensure a good user experience.</a:t>
             </a:r>
-            <a:endParaRPr sz="2800">
+            <a:endParaRPr sz="2800" dirty="0">
               <a:solidFill>
                 <a:schemeClr val="dk1"/>
               </a:solidFill>
             </a:endParaRPr>
           </a:p>
           <a:p>
-            <a:pPr indent="0" lvl="0" marL="0" marR="0" rtl="0" algn="l">
+            <a:pPr marL="0" marR="0" lvl="0" indent="0" algn="l" rtl="0">
               <a:lnSpc>
                 <a:spcPct val="120000"/>
               </a:lnSpc>
@@ -3941,10 +3957,7 @@
               <a:buFont typeface="Arial"/>
               <a:buNone/>
             </a:pPr>
-            <a:r>
-              <a:t/>
-            </a:r>
-            <a:endParaRPr sz="2800">
+            <a:endParaRPr sz="2800" dirty="0">
               <a:solidFill>
                 <a:schemeClr val="dk1"/>
               </a:solidFill>
@@ -3972,12 +3985,12 @@
           </a:ln>
         </p:spPr>
         <p:txBody>
-          <a:bodyPr anchorCtr="0" anchor="t" bIns="0" lIns="0" spcFirstLastPara="1" rIns="0" wrap="square" tIns="0">
+          <a:bodyPr spcFirstLastPara="1" wrap="square" lIns="0" tIns="0" rIns="0" bIns="0" anchor="t" anchorCtr="0">
             <a:noAutofit/>
           </a:bodyPr>
           <a:lstStyle/>
           <a:p>
-            <a:pPr indent="0" lvl="0" marL="0" marR="0" rtl="0" algn="l">
+            <a:pPr marL="0" marR="0" lvl="0" indent="0" algn="l" rtl="0">
               <a:lnSpc>
                 <a:spcPct val="90000"/>
               </a:lnSpc>
@@ -3995,14 +4008,14 @@
               <a:buNone/>
             </a:pPr>
             <a:r>
-              <a:rPr lang="en-US" sz="4800">
+              <a:rPr lang="en-US" sz="4800" dirty="0">
                 <a:solidFill>
                   <a:srgbClr val="E05529"/>
                 </a:solidFill>
               </a:rPr>
-              <a:t>BACK END</a:t>
+              <a:t>SERVER &amp; COMMUNICATION</a:t>
             </a:r>
-            <a:endParaRPr b="0" i="0" sz="4800" u="none" cap="none" strike="noStrike">
+            <a:endParaRPr sz="4800" b="0" i="0" u="none" strike="noStrike" cap="none" dirty="0">
               <a:solidFill>
                 <a:srgbClr val="E05529"/>
               </a:solidFill>
@@ -4034,12 +4047,12 @@
           </a:ln>
         </p:spPr>
         <p:txBody>
-          <a:bodyPr anchorCtr="0" anchor="t" bIns="0" lIns="0" spcFirstLastPara="1" rIns="0" wrap="square" tIns="0">
+          <a:bodyPr spcFirstLastPara="1" wrap="square" lIns="0" tIns="0" rIns="0" bIns="0" anchor="t" anchorCtr="0">
             <a:noAutofit/>
           </a:bodyPr>
           <a:lstStyle/>
           <a:p>
-            <a:pPr indent="-457200" lvl="0" marL="457200" marR="0" rtl="0" algn="l">
+            <a:pPr marL="457200" marR="0" lvl="0" indent="-457200" algn="l" rtl="0">
               <a:lnSpc>
                 <a:spcPct val="120000"/>
               </a:lnSpc>
@@ -4057,45 +4070,21 @@
               <a:buChar char="•"/>
             </a:pPr>
             <a:r>
-              <a:rPr lang="en-US" sz="2800">
+              <a:rPr lang="en-US" sz="2800" dirty="0">
                 <a:solidFill>
                   <a:schemeClr val="dk1"/>
                 </a:solidFill>
               </a:rPr>
-              <a:t>We developed our server using the NodeJS framework, which had strong security boosts as well as a close connection to </a:t>
+              <a:t>We developed our server using the NodeJS framework, which had strong security boosts as well as a close connection to existing community infrastructure</a:t>
             </a:r>
-            <a:r>
-              <a:rPr lang="en-US" sz="2800">
-                <a:solidFill>
-                  <a:schemeClr val="dk1"/>
-                </a:solidFill>
-              </a:rPr>
-              <a:t>existing</a:t>
-            </a:r>
-            <a:r>
-              <a:rPr lang="en-US" sz="2800">
-                <a:solidFill>
-                  <a:schemeClr val="dk1"/>
-                </a:solidFill>
-              </a:rPr>
-              <a:t> community </a:t>
-            </a:r>
-            <a:r>
-              <a:rPr lang="en-US" sz="2800">
-                <a:solidFill>
-                  <a:schemeClr val="dk1"/>
-                </a:solidFill>
-              </a:rPr>
-              <a:t>infrastructure</a:t>
-            </a:r>
-            <a:endParaRPr sz="2800">
+            <a:endParaRPr sz="2800" dirty="0">
               <a:solidFill>
                 <a:schemeClr val="dk1"/>
               </a:solidFill>
             </a:endParaRPr>
           </a:p>
           <a:p>
-            <a:pPr indent="-457200" lvl="0" marL="457200" marR="0" rtl="0" algn="l">
+            <a:pPr marL="457200" marR="0" lvl="0" indent="-457200" algn="l" rtl="0">
               <a:lnSpc>
                 <a:spcPct val="120000"/>
               </a:lnSpc>
@@ -4112,21 +4101,37 @@
               <a:buChar char="•"/>
             </a:pPr>
             <a:r>
-              <a:rPr lang="en-US" sz="2800">
+              <a:rPr lang="en-US" sz="2800" dirty="0">
                 <a:solidFill>
                   <a:schemeClr val="dk1"/>
                 </a:solidFill>
               </a:rPr>
-              <a:t>We extensively used the TeslaJS library that encapsulates the Tesla RESTful API, which is the main API that Tesla vehicles use to connect to Tesla servers</a:t>
+              <a:t>We extensively used the </a:t>
             </a:r>
-            <a:endParaRPr sz="2800">
+            <a:r>
+              <a:rPr lang="en-US" sz="2800" dirty="0" err="1">
+                <a:solidFill>
+                  <a:schemeClr val="dk1"/>
+                </a:solidFill>
+              </a:rPr>
+              <a:t>TeslaJS</a:t>
+            </a:r>
+            <a:r>
+              <a:rPr lang="en-US" sz="2800" dirty="0">
+                <a:solidFill>
+                  <a:schemeClr val="dk1"/>
+                </a:solidFill>
+              </a:rPr>
+              <a:t> library that encapsulates the Tesla RESTful API, which is the main API that Tesla vehicles use to connect to Tesla servers</a:t>
+            </a:r>
+            <a:endParaRPr sz="2800" dirty="0">
               <a:solidFill>
                 <a:schemeClr val="dk1"/>
               </a:solidFill>
             </a:endParaRPr>
           </a:p>
           <a:p>
-            <a:pPr indent="-457200" lvl="0" marL="457200" marR="0" rtl="0" algn="l">
+            <a:pPr marL="457200" marR="0" lvl="0" indent="-457200" algn="l" rtl="0">
               <a:lnSpc>
                 <a:spcPct val="120000"/>
               </a:lnSpc>
@@ -4143,21 +4148,37 @@
               <a:buChar char="•"/>
             </a:pPr>
             <a:r>
-              <a:rPr lang="en-US" sz="2800">
+              <a:rPr lang="en-US" sz="2800" dirty="0">
                 <a:solidFill>
                   <a:schemeClr val="dk1"/>
                 </a:solidFill>
               </a:rPr>
-              <a:t>There is an extensive mySQL database that holds a variety of diagnostic information, user statistics, and provides functionality for users, such as those who own fleets of these vehicles and want quick access to their different cars.</a:t>
+              <a:t>There is an extensive </a:t>
             </a:r>
-            <a:endParaRPr sz="2800">
+            <a:r>
+              <a:rPr lang="en-US" sz="2800" dirty="0" err="1">
+                <a:solidFill>
+                  <a:schemeClr val="dk1"/>
+                </a:solidFill>
+              </a:rPr>
+              <a:t>mySQL</a:t>
+            </a:r>
+            <a:r>
+              <a:rPr lang="en-US" sz="2800" dirty="0">
+                <a:solidFill>
+                  <a:schemeClr val="dk1"/>
+                </a:solidFill>
+              </a:rPr>
+              <a:t> database that holds a variety of diagnostic information, user statistics, and provides functionality for users, such as those who own fleets of these vehicles and want quick access to their different cars.</a:t>
+            </a:r>
+            <a:endParaRPr sz="2800" dirty="0">
               <a:solidFill>
                 <a:schemeClr val="dk1"/>
               </a:solidFill>
             </a:endParaRPr>
           </a:p>
           <a:p>
-            <a:pPr indent="0" lvl="0" marL="0" marR="0" rtl="0" algn="l">
+            <a:pPr marL="0" marR="0" lvl="0" indent="0" algn="l" rtl="0">
               <a:lnSpc>
                 <a:spcPct val="120000"/>
               </a:lnSpc>
@@ -4174,10 +4195,7 @@
               <a:buFont typeface="Arial"/>
               <a:buNone/>
             </a:pPr>
-            <a:r>
-              <a:t/>
-            </a:r>
-            <a:endParaRPr b="0" i="0" sz="2800" u="none" cap="none" strike="noStrike">
+            <a:endParaRPr sz="2800" b="0" i="0" u="none" strike="noStrike" cap="none" dirty="0">
               <a:solidFill>
                 <a:schemeClr val="dk1"/>
               </a:solidFill>
@@ -4197,8 +4215,8 @@
         </p:nvSpPr>
         <p:spPr>
           <a:xfrm>
-            <a:off x="1931989" y="5503233"/>
-            <a:ext cx="8158800" cy="677100"/>
+            <a:off x="1330036" y="3463917"/>
+            <a:ext cx="8977748" cy="677108"/>
           </a:xfrm>
           <a:prstGeom prst="rect">
             <a:avLst/>
@@ -4209,12 +4227,12 @@
           </a:ln>
         </p:spPr>
         <p:txBody>
-          <a:bodyPr anchorCtr="0" anchor="t" bIns="0" lIns="0" spcFirstLastPara="1" rIns="0" wrap="square" tIns="0">
+          <a:bodyPr spcFirstLastPara="1" wrap="square" lIns="0" tIns="0" rIns="0" bIns="0" anchor="t" anchorCtr="0">
             <a:noAutofit/>
           </a:bodyPr>
           <a:lstStyle/>
           <a:p>
-            <a:pPr indent="0" lvl="0" marL="0" marR="0" rtl="0" algn="l">
+            <a:pPr marL="0" marR="0" lvl="0" indent="0" algn="l" rtl="0">
               <a:lnSpc>
                 <a:spcPct val="90000"/>
               </a:lnSpc>
@@ -4232,14 +4250,22 @@
               <a:buNone/>
             </a:pPr>
             <a:r>
-              <a:rPr lang="en-US" sz="4800">
+              <a:rPr lang="en-US" sz="4800" dirty="0">
                 <a:solidFill>
                   <a:srgbClr val="FFFFFF"/>
                 </a:solidFill>
               </a:rPr>
-              <a:t>Purpose: Grey Market Teslas</a:t>
+              <a:t>Purpose: Grey Market </a:t>
             </a:r>
-            <a:endParaRPr b="0" i="0" sz="4800" u="none" cap="none" strike="noStrike">
+            <a:r>
+              <a:rPr lang="en-US" sz="4800" dirty="0" err="1">
+                <a:solidFill>
+                  <a:srgbClr val="FFFFFF"/>
+                </a:solidFill>
+              </a:rPr>
+              <a:t>Teslas</a:t>
+            </a:r>
+            <a:endParaRPr sz="4800" b="0" i="0" u="none" strike="noStrike" cap="none" dirty="0">
               <a:solidFill>
                 <a:srgbClr val="FFFFFF"/>
               </a:solidFill>
@@ -4259,8 +4285,8 @@
         </p:nvSpPr>
         <p:spPr>
           <a:xfrm>
-            <a:off x="1964266" y="6422030"/>
-            <a:ext cx="8126412" cy="14311611"/>
+            <a:off x="1330035" y="4382714"/>
+            <a:ext cx="8977747" cy="14311611"/>
           </a:xfrm>
           <a:prstGeom prst="rect">
             <a:avLst/>
@@ -4271,12 +4297,12 @@
           </a:ln>
         </p:spPr>
         <p:txBody>
-          <a:bodyPr anchorCtr="0" anchor="t" bIns="0" lIns="0" spcFirstLastPara="1" rIns="0" wrap="square" tIns="0">
+          <a:bodyPr spcFirstLastPara="1" wrap="square" lIns="0" tIns="0" rIns="0" bIns="0" anchor="t" anchorCtr="0">
             <a:noAutofit/>
           </a:bodyPr>
           <a:lstStyle/>
           <a:p>
-            <a:pPr indent="-457200" lvl="0" marL="457200" marR="0" rtl="0" algn="l">
+            <a:pPr marL="457200" marR="0" lvl="0" indent="-457200" algn="l" rtl="0">
               <a:lnSpc>
                 <a:spcPct val="120000"/>
               </a:lnSpc>
@@ -4294,7 +4320,7 @@
               <a:buChar char="•"/>
             </a:pPr>
             <a:r>
-              <a:rPr lang="en-US" sz="2800">
+              <a:rPr lang="en-US" sz="2800" dirty="0">
                 <a:solidFill>
                   <a:schemeClr val="lt1"/>
                 </a:solidFill>
@@ -4305,10 +4331,10 @@
               </a:rPr>
               <a:t>In the event of a Tesla vehicle being involved in an accident and having damages totaling the vehicle, Tesla refuses to continue support, both physically and digitally. This is most evident in Tesla servers refusing to acknowledge requests to and from the mobile application. </a:t>
             </a:r>
-            <a:endParaRPr/>
+            <a:endParaRPr dirty="0"/>
           </a:p>
           <a:p>
-            <a:pPr indent="-457200" lvl="0" marL="457200" marR="0" rtl="0" algn="l">
+            <a:pPr marL="457200" marR="0" lvl="0" indent="-457200" algn="l" rtl="0">
               <a:lnSpc>
                 <a:spcPct val="120000"/>
               </a:lnSpc>
@@ -4326,7 +4352,7 @@
               <a:buChar char="•"/>
             </a:pPr>
             <a:r>
-              <a:rPr lang="en-US" sz="2800">
+              <a:rPr lang="en-US" sz="2800" dirty="0">
                 <a:solidFill>
                   <a:schemeClr val="lt1"/>
                 </a:solidFill>
@@ -4335,10 +4361,10 @@
                 <a:cs typeface="Verdana"/>
                 <a:sym typeface="Verdana"/>
               </a:rPr>
-              <a:t>Phil Sadow, of Ingineerix, has developed a very simple web app that gives back some </a:t>
+              <a:t>Phil </a:t>
             </a:r>
             <a:r>
-              <a:rPr lang="en-US" sz="2800">
+              <a:rPr lang="en-US" sz="2800" dirty="0" err="1">
                 <a:solidFill>
                   <a:schemeClr val="lt1"/>
                 </a:solidFill>
@@ -4347,10 +4373,10 @@
                 <a:cs typeface="Verdana"/>
                 <a:sym typeface="Verdana"/>
               </a:rPr>
-              <a:t>functionality</a:t>
+              <a:t>Sadow</a:t>
             </a:r>
             <a:r>
-              <a:rPr lang="en-US" sz="2800">
+              <a:rPr lang="en-US" sz="2800" dirty="0">
                 <a:solidFill>
                   <a:schemeClr val="lt1"/>
                 </a:solidFill>
@@ -4359,9 +4385,33 @@
                 <a:cs typeface="Verdana"/>
                 <a:sym typeface="Verdana"/>
               </a:rPr>
-              <a:t> to the users. However, the app is dated and missing many features that many web apps have today.</a:t>
+              <a:t>, of </a:t>
             </a:r>
-            <a:endParaRPr sz="2800">
+            <a:r>
+              <a:rPr lang="en-US" sz="2800" dirty="0" err="1">
+                <a:solidFill>
+                  <a:schemeClr val="lt1"/>
+                </a:solidFill>
+                <a:latin typeface="Verdana"/>
+                <a:ea typeface="Verdana"/>
+                <a:cs typeface="Verdana"/>
+                <a:sym typeface="Verdana"/>
+              </a:rPr>
+              <a:t>Ingineerix</a:t>
+            </a:r>
+            <a:r>
+              <a:rPr lang="en-US" sz="2800" dirty="0">
+                <a:solidFill>
+                  <a:schemeClr val="lt1"/>
+                </a:solidFill>
+                <a:latin typeface="Verdana"/>
+                <a:ea typeface="Verdana"/>
+                <a:cs typeface="Verdana"/>
+                <a:sym typeface="Verdana"/>
+              </a:rPr>
+              <a:t>, has developed a very simple web app that gives back some functionality to the users. However, the app is dated and missing many features that many web apps have today.</a:t>
+            </a:r>
+            <a:endParaRPr sz="2800" dirty="0">
               <a:solidFill>
                 <a:schemeClr val="lt1"/>
               </a:solidFill>
@@ -4372,7 +4422,7 @@
             </a:endParaRPr>
           </a:p>
           <a:p>
-            <a:pPr indent="-457200" lvl="0" marL="457200" marR="0" rtl="0" algn="l">
+            <a:pPr marL="457200" marR="0" lvl="0" indent="-457200" algn="l" rtl="0">
               <a:lnSpc>
                 <a:spcPct val="120000"/>
               </a:lnSpc>
@@ -4390,7 +4440,7 @@
               <a:buChar char="•"/>
             </a:pPr>
             <a:r>
-              <a:rPr lang="en-US" sz="2800">
+              <a:rPr lang="en-US" sz="2800" dirty="0">
                 <a:solidFill>
                   <a:schemeClr val="lt1"/>
                 </a:solidFill>
@@ -4401,10 +4451,10 @@
               </a:rPr>
               <a:t>Phil also requested that we update his back end since it was written in Perl. He wanted us to introduce a fleet feature that would allow users to have more than one vehicle registered to their account.</a:t>
             </a:r>
-            <a:endParaRPr/>
+            <a:endParaRPr dirty="0"/>
           </a:p>
           <a:p>
-            <a:pPr indent="-457200" lvl="0" marL="457200" marR="0" rtl="0" algn="l">
+            <a:pPr marL="457200" marR="0" lvl="0" indent="-457200" algn="l" rtl="0">
               <a:lnSpc>
                 <a:spcPct val="120000"/>
               </a:lnSpc>
@@ -4422,7 +4472,7 @@
               <a:buChar char="•"/>
             </a:pPr>
             <a:r>
-              <a:rPr lang="en-US" sz="2800">
+              <a:rPr lang="en-US" sz="2800" dirty="0">
                 <a:solidFill>
                   <a:schemeClr val="lt1"/>
                 </a:solidFill>
@@ -4433,7 +4483,7 @@
               </a:rPr>
               <a:t>Another request Phil had was to make the app more pleasing to look at. He wanted the app to be more modern, and to closely resemble Tesla’s own app.</a:t>
             </a:r>
-            <a:endParaRPr/>
+            <a:endParaRPr dirty="0"/>
           </a:p>
         </p:txBody>
       </p:sp>
@@ -4457,12 +4507,12 @@
           </a:ln>
         </p:spPr>
         <p:txBody>
-          <a:bodyPr anchorCtr="0" anchor="t" bIns="0" lIns="0" spcFirstLastPara="1" rIns="0" wrap="square" tIns="0">
+          <a:bodyPr spcFirstLastPara="1" wrap="square" lIns="0" tIns="0" rIns="0" bIns="0" anchor="t" anchorCtr="0">
             <a:noAutofit/>
           </a:bodyPr>
           <a:lstStyle/>
           <a:p>
-            <a:pPr indent="0" lvl="0" marL="0" marR="0" rtl="0" algn="l">
+            <a:pPr marL="0" marR="0" lvl="0" indent="0" algn="l" rtl="0">
               <a:lnSpc>
                 <a:spcPct val="90000"/>
               </a:lnSpc>
@@ -4491,7 +4541,7 @@
               </a:rPr>
               <a:t>Tesla Web Application</a:t>
             </a:r>
-            <a:endParaRPr b="0" i="0" sz="12500" u="none" cap="none" strike="noStrike">
+            <a:endParaRPr sz="12500" b="0" i="0" u="none" strike="noStrike" cap="none">
               <a:solidFill>
                 <a:srgbClr val="E05529"/>
               </a:solidFill>
@@ -4523,12 +4573,12 @@
           </a:ln>
         </p:spPr>
         <p:txBody>
-          <a:bodyPr anchorCtr="0" anchor="t" bIns="0" lIns="0" spcFirstLastPara="1" rIns="0" wrap="square" tIns="0">
+          <a:bodyPr spcFirstLastPara="1" wrap="square" lIns="0" tIns="0" rIns="0" bIns="0" anchor="t" anchorCtr="0">
             <a:noAutofit/>
           </a:bodyPr>
           <a:lstStyle/>
           <a:p>
-            <a:pPr indent="0" lvl="0" marL="0" marR="0" rtl="0" algn="l">
+            <a:pPr marL="0" marR="0" lvl="0" indent="0" algn="l" rtl="0">
               <a:lnSpc>
                 <a:spcPct val="130909"/>
               </a:lnSpc>
@@ -4557,7 +4607,7 @@
               </a:rPr>
               <a:t>Even after a totaled Tesla vehicle is repaired, owners lose the ability to connect to their vehicle remotely. This application seeks to fix that. </a:t>
             </a:r>
-            <a:endParaRPr b="0" i="0" sz="6600" u="none" cap="none" strike="noStrike">
+            <a:endParaRPr sz="6600" b="0" i="0" u="none" strike="noStrike" cap="none">
               <a:solidFill>
                 <a:schemeClr val="dk1"/>
               </a:solidFill>
@@ -4577,7 +4627,7 @@
         </p:nvSpPr>
         <p:spPr>
           <a:xfrm>
-            <a:off x="33934400" y="5503233"/>
+            <a:off x="33934400" y="3463917"/>
             <a:ext cx="8158690" cy="677108"/>
           </a:xfrm>
           <a:prstGeom prst="rect">
@@ -4589,12 +4639,12 @@
           </a:ln>
         </p:spPr>
         <p:txBody>
-          <a:bodyPr anchorCtr="0" anchor="t" bIns="0" lIns="0" spcFirstLastPara="1" rIns="0" wrap="square" tIns="0">
+          <a:bodyPr spcFirstLastPara="1" wrap="square" lIns="0" tIns="0" rIns="0" bIns="0" anchor="t" anchorCtr="0">
             <a:noAutofit/>
           </a:bodyPr>
           <a:lstStyle/>
           <a:p>
-            <a:pPr indent="0" lvl="0" marL="0" marR="0" rtl="0" algn="l">
+            <a:pPr marL="0" marR="0" lvl="0" indent="0" algn="l" rtl="0">
               <a:lnSpc>
                 <a:spcPct val="90000"/>
               </a:lnSpc>
@@ -4612,14 +4662,14 @@
               <a:buNone/>
             </a:pPr>
             <a:r>
-              <a:rPr b="1" lang="en-US" sz="4800">
+              <a:rPr lang="en-US" sz="4800" b="1" dirty="0">
                 <a:solidFill>
                   <a:srgbClr val="FFFFFF"/>
                 </a:solidFill>
               </a:rPr>
               <a:t>Finished Result</a:t>
             </a:r>
-            <a:endParaRPr b="1" i="0" sz="4800" u="none" cap="none" strike="noStrike">
+            <a:endParaRPr sz="4800" b="1" i="0" u="none" strike="noStrike" cap="none" dirty="0">
               <a:solidFill>
                 <a:srgbClr val="FFFFFF"/>
               </a:solidFill>
@@ -4635,7 +4685,7 @@
         </p:nvSpPr>
         <p:spPr>
           <a:xfrm>
-            <a:off x="33966678" y="6422030"/>
+            <a:off x="33966678" y="4382714"/>
             <a:ext cx="8126412" cy="14311611"/>
           </a:xfrm>
           <a:prstGeom prst="rect">
@@ -4647,12 +4697,12 @@
           </a:ln>
         </p:spPr>
         <p:txBody>
-          <a:bodyPr anchorCtr="0" anchor="t" bIns="0" lIns="0" spcFirstLastPara="1" rIns="0" wrap="square" tIns="0">
+          <a:bodyPr spcFirstLastPara="1" wrap="square" lIns="0" tIns="0" rIns="0" bIns="0" anchor="t" anchorCtr="0">
             <a:noAutofit/>
           </a:bodyPr>
           <a:lstStyle/>
           <a:p>
-            <a:pPr indent="-457200" lvl="0" marL="457200" marR="0" rtl="0" algn="l">
+            <a:pPr marL="457200" marR="0" lvl="0" indent="-457200" algn="l" rtl="0">
               <a:lnSpc>
                 <a:spcPct val="120000"/>
               </a:lnSpc>
@@ -4670,17 +4720,17 @@
               <a:buChar char="•"/>
             </a:pPr>
             <a:r>
-              <a:rPr lang="en-US" sz="2800">
+              <a:rPr lang="en-US" sz="2800" dirty="0">
                 <a:solidFill>
                   <a:schemeClr val="dk1"/>
                 </a:solidFill>
               </a:rPr>
               <a:t>This application has restored the mobile functionality that is seen in the first party application by Tesla</a:t>
             </a:r>
-            <a:endParaRPr/>
+            <a:endParaRPr dirty="0"/>
           </a:p>
           <a:p>
-            <a:pPr indent="-457200" lvl="0" marL="457200" marR="0" rtl="0" algn="l">
+            <a:pPr marL="457200" marR="0" lvl="0" indent="-457200" algn="l" rtl="0">
               <a:lnSpc>
                 <a:spcPct val="120000"/>
               </a:lnSpc>
@@ -4697,21 +4747,21 @@
               <a:buChar char="•"/>
             </a:pPr>
             <a:r>
-              <a:rPr b="1" lang="en-US" sz="2800">
+              <a:rPr lang="en-US" sz="2800" b="1" dirty="0">
                 <a:solidFill>
                   <a:schemeClr val="dk1"/>
                 </a:solidFill>
               </a:rPr>
               <a:t>Features Implemented:</a:t>
             </a:r>
-            <a:endParaRPr b="1" sz="2800">
+            <a:endParaRPr sz="2800" b="1" dirty="0">
               <a:solidFill>
                 <a:schemeClr val="dk1"/>
               </a:solidFill>
             </a:endParaRPr>
           </a:p>
           <a:p>
-            <a:pPr indent="-406400" lvl="1" marL="914400" marR="0" rtl="0" algn="l">
+            <a:pPr marL="914400" marR="0" lvl="1" indent="-406400" algn="l" rtl="0">
               <a:lnSpc>
                 <a:spcPct val="120000"/>
               </a:lnSpc>
@@ -4728,21 +4778,21 @@
               <a:buChar char="○"/>
             </a:pPr>
             <a:r>
-              <a:rPr lang="en-US" sz="2800">
+              <a:rPr lang="en-US" sz="2800" dirty="0">
                 <a:solidFill>
                   <a:schemeClr val="dk1"/>
                 </a:solidFill>
               </a:rPr>
               <a:t>Climate Control</a:t>
             </a:r>
-            <a:endParaRPr sz="2800">
+            <a:endParaRPr sz="2800" dirty="0">
               <a:solidFill>
                 <a:schemeClr val="dk1"/>
               </a:solidFill>
             </a:endParaRPr>
           </a:p>
           <a:p>
-            <a:pPr indent="-406400" lvl="1" marL="914400" marR="0" rtl="0" algn="l">
+            <a:pPr marL="914400" marR="0" lvl="1" indent="-406400" algn="l" rtl="0">
               <a:lnSpc>
                 <a:spcPct val="120000"/>
               </a:lnSpc>
@@ -4759,21 +4809,21 @@
               <a:buChar char="○"/>
             </a:pPr>
             <a:r>
-              <a:rPr lang="en-US" sz="2800">
+              <a:rPr lang="en-US" sz="2800" dirty="0">
                 <a:solidFill>
                   <a:schemeClr val="dk1"/>
                 </a:solidFill>
               </a:rPr>
               <a:t>Turn Car On/Off</a:t>
             </a:r>
-            <a:endParaRPr sz="2800">
+            <a:endParaRPr sz="2800" dirty="0">
               <a:solidFill>
                 <a:schemeClr val="dk1"/>
               </a:solidFill>
             </a:endParaRPr>
           </a:p>
           <a:p>
-            <a:pPr indent="-406400" lvl="1" marL="914400" marR="0" rtl="0" algn="l">
+            <a:pPr marL="914400" marR="0" lvl="1" indent="-406400" algn="l" rtl="0">
               <a:lnSpc>
                 <a:spcPct val="120000"/>
               </a:lnSpc>
@@ -4790,21 +4840,21 @@
               <a:buChar char="○"/>
             </a:pPr>
             <a:r>
-              <a:rPr lang="en-US" sz="2800">
+              <a:rPr lang="en-US" sz="2800" dirty="0">
                 <a:solidFill>
                   <a:schemeClr val="dk1"/>
                 </a:solidFill>
               </a:rPr>
               <a:t>Summon Car</a:t>
             </a:r>
-            <a:endParaRPr sz="2800">
+            <a:endParaRPr sz="2800" dirty="0">
               <a:solidFill>
                 <a:schemeClr val="dk1"/>
               </a:solidFill>
             </a:endParaRPr>
           </a:p>
           <a:p>
-            <a:pPr indent="-406400" lvl="1" marL="914400" marR="0" rtl="0" algn="l">
+            <a:pPr marL="914400" marR="0" lvl="1" indent="-406400" algn="l" rtl="0">
               <a:lnSpc>
                 <a:spcPct val="120000"/>
               </a:lnSpc>
@@ -4821,21 +4871,21 @@
               <a:buChar char="○"/>
             </a:pPr>
             <a:r>
-              <a:rPr lang="en-US" sz="2800">
+              <a:rPr lang="en-US" sz="2800" dirty="0">
                 <a:solidFill>
                   <a:schemeClr val="dk1"/>
                 </a:solidFill>
               </a:rPr>
               <a:t>Lock/Unlock Doors</a:t>
             </a:r>
-            <a:endParaRPr sz="2800">
+            <a:endParaRPr sz="2800" dirty="0">
               <a:solidFill>
                 <a:schemeClr val="dk1"/>
               </a:solidFill>
             </a:endParaRPr>
           </a:p>
           <a:p>
-            <a:pPr indent="-406400" lvl="1" marL="914400" marR="0" rtl="0" algn="l">
+            <a:pPr marL="914400" marR="0" lvl="1" indent="-406400" algn="l" rtl="0">
               <a:lnSpc>
                 <a:spcPct val="120000"/>
               </a:lnSpc>
@@ -4852,21 +4902,21 @@
               <a:buChar char="○"/>
             </a:pPr>
             <a:r>
-              <a:rPr lang="en-US" sz="2800">
+              <a:rPr lang="en-US" sz="2800" dirty="0">
                 <a:solidFill>
                   <a:schemeClr val="dk1"/>
                 </a:solidFill>
               </a:rPr>
               <a:t>View Diagnostics of the Car</a:t>
             </a:r>
-            <a:endParaRPr sz="2800">
+            <a:endParaRPr sz="2800" dirty="0">
               <a:solidFill>
                 <a:schemeClr val="dk1"/>
               </a:solidFill>
             </a:endParaRPr>
           </a:p>
           <a:p>
-            <a:pPr indent="-457200" lvl="0" marL="457200" marR="0" rtl="0" algn="l">
+            <a:pPr marL="457200" marR="0" lvl="0" indent="-457200" algn="l" rtl="0">
               <a:lnSpc>
                 <a:spcPct val="120000"/>
               </a:lnSpc>
@@ -4884,17 +4934,17 @@
               <a:buChar char="•"/>
             </a:pPr>
             <a:r>
-              <a:rPr lang="en-US" sz="2800">
+              <a:rPr lang="en-US" sz="2800" dirty="0">
                 <a:solidFill>
                   <a:schemeClr val="dk1"/>
                 </a:solidFill>
               </a:rPr>
               <a:t>Design is similar to that of Tesla’s own to help users become familiar with where features are and how features work</a:t>
             </a:r>
-            <a:endParaRPr/>
+            <a:endParaRPr dirty="0"/>
           </a:p>
           <a:p>
-            <a:pPr indent="0" lvl="0" marL="0" marR="0" rtl="0" algn="l">
+            <a:pPr marL="0" marR="0" lvl="0" indent="0" algn="l" rtl="0">
               <a:lnSpc>
                 <a:spcPct val="120000"/>
               </a:lnSpc>
@@ -4906,10 +4956,7 @@
               </a:spcAft>
               <a:buNone/>
             </a:pPr>
-            <a:r>
-              <a:t/>
-            </a:r>
-            <a:endParaRPr/>
+            <a:endParaRPr dirty="0"/>
           </a:p>
         </p:txBody>
       </p:sp>
@@ -4933,12 +4980,12 @@
           </a:ln>
         </p:spPr>
         <p:txBody>
-          <a:bodyPr anchorCtr="0" anchor="ctr" bIns="0" lIns="0" spcFirstLastPara="1" rIns="0" wrap="square" tIns="0">
+          <a:bodyPr spcFirstLastPara="1" wrap="square" lIns="0" tIns="0" rIns="0" bIns="0" anchor="ctr" anchorCtr="0">
             <a:noAutofit/>
           </a:bodyPr>
           <a:lstStyle/>
           <a:p>
-            <a:pPr indent="0" lvl="0" marL="0" marR="0" rtl="0" algn="r">
+            <a:pPr marL="0" marR="0" lvl="0" indent="0" algn="r" rtl="0">
               <a:lnSpc>
                 <a:spcPct val="90000"/>
               </a:lnSpc>
@@ -4967,7 +5014,7 @@
               </a:rPr>
               <a:t>Group #22</a:t>
             </a:r>
-            <a:endParaRPr b="0" i="0" sz="5400" u="none" cap="none" strike="noStrike">
+            <a:endParaRPr sz="5400" b="0" i="0" u="none" strike="noStrike" cap="none">
               <a:solidFill>
                 <a:schemeClr val="lt1"/>
               </a:solidFill>
@@ -4981,7 +5028,7 @@
       </p:sp>
       <p:pic>
         <p:nvPicPr>
-          <p:cNvPr descr="Image result for tesla car" id="46" name="Google Shape;46;p3"/>
+          <p:cNvPr id="46" name="Google Shape;46;p3" descr="Image result for tesla car"/>
           <p:cNvPicPr preferRelativeResize="0"/>
           <p:nvPr/>
         </p:nvPicPr>
@@ -5023,7 +5070,7 @@
         </p:blipFill>
         <p:spPr>
           <a:xfrm>
-            <a:off x="4105875" y="19495075"/>
+            <a:off x="4105875" y="18206599"/>
             <a:ext cx="3811050" cy="6769225"/>
           </a:xfrm>
           <a:prstGeom prst="rect">
@@ -5037,30 +5084,32 @@
       </p:pic>
       <p:pic>
         <p:nvPicPr>
-          <p:cNvPr descr="Image result for tesla app" id="48" name="Google Shape;48;p3"/>
-          <p:cNvPicPr preferRelativeResize="0"/>
+          <p:cNvPr id="3" name="Picture 2">
+            <a:extLst>
+              <a:ext uri="{FF2B5EF4-FFF2-40B4-BE49-F238E27FC236}">
+                <a16:creationId xmlns:a16="http://schemas.microsoft.com/office/drawing/2014/main" id="{8C52A02D-6F47-4888-AC84-45F2C404F792}"/>
+              </a:ext>
+            </a:extLst>
+          </p:cNvPr>
+          <p:cNvPicPr>
+            <a:picLocks noChangeAspect="1"/>
+          </p:cNvPicPr>
           <p:nvPr/>
         </p:nvPicPr>
         <p:blipFill>
-          <a:blip r:embed="rId5">
-            <a:alphaModFix/>
-          </a:blip>
+          <a:blip r:embed="rId5"/>
           <a:stretch>
             <a:fillRect/>
           </a:stretch>
         </p:blipFill>
         <p:spPr>
           <a:xfrm>
-            <a:off x="34037527" y="17009475"/>
-            <a:ext cx="8126400" cy="13925307"/>
+            <a:off x="33687126" y="19336344"/>
+            <a:ext cx="8653238" cy="11598425"/>
           </a:xfrm>
           <a:prstGeom prst="rect">
             <a:avLst/>
           </a:prstGeom>
-          <a:noFill/>
-          <a:ln>
-            <a:noFill/>
-          </a:ln>
         </p:spPr>
       </p:pic>
     </p:spTree>
@@ -5072,7 +5121,7 @@
 </file>
 
 <file path=ppt/theme/theme1.xml><?xml version="1.0" encoding="utf-8"?>
-<a:theme xmlns:a="http://schemas.openxmlformats.org/drawingml/2006/main" xmlns:r="http://schemas.openxmlformats.org/officeDocument/2006/relationships" name="research_poster_template-48x36">
+<a:theme xmlns:a="http://schemas.openxmlformats.org/drawingml/2006/main" name="research_poster_template-48x36">
   <a:themeElements>
     <a:clrScheme name="OSU COE">
       <a:dk1>
@@ -5347,11 +5396,13 @@
       </a:bgFillStyleLst>
     </a:fmtScheme>
   </a:themeElements>
+  <a:objectDefaults/>
+  <a:extraClrSchemeLst/>
 </a:theme>
 </file>
 
 <file path=ppt/theme/theme2.xml><?xml version="1.0" encoding="utf-8"?>
-<a:theme xmlns:a="http://schemas.openxmlformats.org/drawingml/2006/main" xmlns:r="http://schemas.openxmlformats.org/officeDocument/2006/relationships" name="Office Theme">
+<a:theme xmlns:a="http://schemas.openxmlformats.org/drawingml/2006/main" name="Office Theme">
   <a:themeElements>
     <a:clrScheme name="Office">
       <a:dk1>
@@ -5626,5 +5677,7 @@
       </a:bgFillStyleLst>
     </a:fmtScheme>
   </a:themeElements>
+  <a:objectDefaults/>
+  <a:extraClrSchemeLst/>
 </a:theme>
 </file>
</xml_diff>